<commit_message>
Remove PPT slider Footer Confidential word
Signed-off-by: Julie Zhang <julie.zhang@intel.com>
</commit_message>
<xml_diff>
--- a/spi-aib/doc/SPI_User_guide.pptx
+++ b/spi-aib/doc/SPI_User_guide.pptx
@@ -657,7 +657,7 @@
           <a:p>
             <a:fld id="{E10B726A-C477-6444-83BF-F1538D69AD12}" type="datetimeFigureOut">
               <a:rPr lang="en-US" smtClean="0"/>
-              <a:t>10/25/2021</a:t>
+              <a:t>11/8/2021</a:t>
             </a:fld>
             <a:endParaRPr lang="en-US"/>
           </a:p>
@@ -1173,7 +1173,7 @@
           </a:ln>
           <a:extLst>
             <a:ext uri="{C572A759-6A51-4108-AA02-DFA0A04FC94B}">
-              <ma14:wrappingTextBoxFlag xmlns:ma14="http://schemas.microsoft.com/office/mac/drawingml/2011/main" xmlns:a14="http://schemas.microsoft.com/office/drawing/2010/main" xmlns:m="http://schemas.openxmlformats.org/officeDocument/2006/math" xmlns="" val="1"/>
+              <ma14:wrappingTextBoxFlag xmlns="" xmlns:m="http://schemas.openxmlformats.org/officeDocument/2006/math" xmlns:a14="http://schemas.microsoft.com/office/drawing/2010/main" xmlns:ma14="http://schemas.microsoft.com/office/mac/drawingml/2011/main" val="1"/>
             </a:ext>
           </a:extLst>
         </p:spPr>
@@ -2650,7 +2650,7 @@
           </a:ln>
           <a:extLst>
             <a:ext uri="{C572A759-6A51-4108-AA02-DFA0A04FC94B}">
-              <ma14:wrappingTextBoxFlag xmlns:ma14="http://schemas.microsoft.com/office/mac/drawingml/2011/main" xmlns:a14="http://schemas.microsoft.com/office/drawing/2010/main" xmlns:m="http://schemas.openxmlformats.org/officeDocument/2006/math" xmlns="" val="1"/>
+              <ma14:wrappingTextBoxFlag xmlns="" xmlns:m="http://schemas.openxmlformats.org/officeDocument/2006/math" xmlns:a14="http://schemas.microsoft.com/office/drawing/2010/main" xmlns:ma14="http://schemas.microsoft.com/office/mac/drawingml/2011/main" val="1"/>
             </a:ext>
           </a:extLst>
         </p:spPr>
@@ -2893,7 +2893,7 @@
           </a:ln>
           <a:extLst>
             <a:ext uri="{C572A759-6A51-4108-AA02-DFA0A04FC94B}">
-              <ma14:wrappingTextBoxFlag xmlns:ma14="http://schemas.microsoft.com/office/mac/drawingml/2011/main" xmlns:a14="http://schemas.microsoft.com/office/drawing/2010/main" xmlns:m="http://schemas.openxmlformats.org/officeDocument/2006/math" xmlns="" val="1"/>
+              <ma14:wrappingTextBoxFlag xmlns="" xmlns:m="http://schemas.openxmlformats.org/officeDocument/2006/math" xmlns:a14="http://schemas.microsoft.com/office/drawing/2010/main" xmlns:ma14="http://schemas.microsoft.com/office/mac/drawingml/2011/main" val="1"/>
             </a:ext>
           </a:extLst>
         </p:spPr>
@@ -2989,7 +2989,7 @@
           </a:ln>
           <a:extLst>
             <a:ext uri="{C572A759-6A51-4108-AA02-DFA0A04FC94B}">
-              <ma14:wrappingTextBoxFlag xmlns:ma14="http://schemas.microsoft.com/office/mac/drawingml/2011/main" xmlns:a14="http://schemas.microsoft.com/office/drawing/2010/main" xmlns:m="http://schemas.openxmlformats.org/officeDocument/2006/math" xmlns="" val="1"/>
+              <ma14:wrappingTextBoxFlag xmlns="" xmlns:m="http://schemas.openxmlformats.org/officeDocument/2006/math" xmlns:a14="http://schemas.microsoft.com/office/drawing/2010/main" xmlns:ma14="http://schemas.microsoft.com/office/mac/drawingml/2011/main" val="1"/>
             </a:ext>
           </a:extLst>
         </p:spPr>
@@ -3427,7 +3427,7 @@
           </a:ln>
           <a:extLst>
             <a:ext uri="{C572A759-6A51-4108-AA02-DFA0A04FC94B}">
-              <ma14:wrappingTextBoxFlag xmlns:ma14="http://schemas.microsoft.com/office/mac/drawingml/2011/main" xmlns:a14="http://schemas.microsoft.com/office/drawing/2010/main" xmlns:m="http://schemas.openxmlformats.org/officeDocument/2006/math" xmlns="" val="1"/>
+              <ma14:wrappingTextBoxFlag xmlns="" xmlns:m="http://schemas.openxmlformats.org/officeDocument/2006/math" xmlns:a14="http://schemas.microsoft.com/office/drawing/2010/main" xmlns:ma14="http://schemas.microsoft.com/office/mac/drawingml/2011/main" val="1"/>
             </a:ext>
           </a:extLst>
         </p:spPr>
@@ -3808,7 +3808,7 @@
           </a:ln>
           <a:extLst>
             <a:ext uri="{C572A759-6A51-4108-AA02-DFA0A04FC94B}">
-              <ma14:wrappingTextBoxFlag xmlns:ma14="http://schemas.microsoft.com/office/mac/drawingml/2011/main" xmlns:a14="http://schemas.microsoft.com/office/drawing/2010/main" xmlns:m="http://schemas.openxmlformats.org/officeDocument/2006/math" xmlns="" val="1"/>
+              <ma14:wrappingTextBoxFlag xmlns="" xmlns:m="http://schemas.openxmlformats.org/officeDocument/2006/math" xmlns:a14="http://schemas.microsoft.com/office/drawing/2010/main" xmlns:ma14="http://schemas.microsoft.com/office/mac/drawingml/2011/main" val="1"/>
             </a:ext>
           </a:extLst>
         </p:spPr>
@@ -3931,87 +3931,6 @@
           <a:chExt cx="0" cy="0"/>
         </a:xfrm>
       </p:grpSpPr>
-      <p:sp>
-        <p:nvSpPr>
-          <p:cNvPr id="11" name="Rectangle 10">
-            <a:extLst>
-              <a:ext uri="{FF2B5EF4-FFF2-40B4-BE49-F238E27FC236}">
-                <a16:creationId xmlns:a16="http://schemas.microsoft.com/office/drawing/2014/main" id="{C8B5B8CD-DD94-44E8-9F69-C9075C2E0A93}"/>
-              </a:ext>
-            </a:extLst>
-          </p:cNvPr>
-          <p:cNvSpPr/>
-          <p:nvPr userDrawn="1"/>
-        </p:nvSpPr>
-        <p:spPr>
-          <a:xfrm>
-            <a:off x="0" y="6407451"/>
-            <a:ext cx="11736987" cy="450549"/>
-          </a:xfrm>
-          <a:prstGeom prst="rect">
-            <a:avLst/>
-          </a:prstGeom>
-          <a:solidFill>
-            <a:schemeClr val="tx2"/>
-          </a:solidFill>
-          <a:ln w="12700" cap="flat">
-            <a:noFill/>
-            <a:miter lim="400000"/>
-          </a:ln>
-          <a:effectLst/>
-          <a:sp3d/>
-        </p:spPr>
-        <p:style>
-          <a:lnRef idx="0">
-            <a:scrgbClr r="0" g="0" b="0"/>
-          </a:lnRef>
-          <a:fillRef idx="0">
-            <a:scrgbClr r="0" g="0" b="0"/>
-          </a:fillRef>
-          <a:effectRef idx="0">
-            <a:scrgbClr r="0" g="0" b="0"/>
-          </a:effectRef>
-          <a:fontRef idx="none"/>
-        </p:style>
-        <p:txBody>
-          <a:bodyPr rot="0" spcFirstLastPara="1" vertOverflow="overflow" horzOverflow="overflow" vert="horz" wrap="square" lIns="50800" tIns="50800" rIns="50800" bIns="50800" numCol="1" spcCol="38100" rtlCol="0" anchor="ctr">
-            <a:spAutoFit/>
-          </a:bodyPr>
-          <a:lstStyle/>
-          <a:p>
-            <a:pPr marL="0" marR="0" indent="0" algn="ctr" defTabSz="825500" rtl="0" fontAlgn="auto" latinLnBrk="0" hangingPunct="0">
-              <a:lnSpc>
-                <a:spcPct val="100000"/>
-              </a:lnSpc>
-              <a:spcBef>
-                <a:spcPts val="0"/>
-              </a:spcBef>
-              <a:spcAft>
-                <a:spcPts val="0"/>
-              </a:spcAft>
-              <a:buClrTx/>
-              <a:buSzTx/>
-              <a:buFontTx/>
-              <a:buNone/>
-              <a:tabLst/>
-            </a:pPr>
-            <a:endParaRPr kumimoji="0" lang="en-US" sz="3200" b="0" i="0" u="none" strike="noStrike" cap="none" spc="0" normalizeH="0" baseline="0">
-              <a:ln>
-                <a:noFill/>
-              </a:ln>
-              <a:solidFill>
-                <a:srgbClr val="FFFFFF"/>
-              </a:solidFill>
-              <a:effectLst/>
-              <a:uFillTx/>
-              <a:latin typeface="Helvetica Neue Medium"/>
-              <a:ea typeface="Helvetica Neue Medium"/>
-              <a:cs typeface="Helvetica Neue Medium"/>
-              <a:sym typeface="Helvetica Neue Medium"/>
-            </a:endParaRPr>
-          </a:p>
-        </p:txBody>
-      </p:sp>
       <p:pic>
         <p:nvPicPr>
           <p:cNvPr id="721" name="Image" descr="Image"/>
@@ -4153,84 +4072,6 @@
       </p:sp>
       <p:sp>
         <p:nvSpPr>
-          <p:cNvPr id="13" name="Rectangle 12">
-            <a:extLst>
-              <a:ext uri="{FF2B5EF4-FFF2-40B4-BE49-F238E27FC236}">
-                <a16:creationId xmlns:a16="http://schemas.microsoft.com/office/drawing/2014/main" id="{ED4D76E8-466A-4C06-9261-BDE1AA914749}"/>
-              </a:ext>
-            </a:extLst>
-          </p:cNvPr>
-          <p:cNvSpPr/>
-          <p:nvPr userDrawn="1"/>
-        </p:nvSpPr>
-        <p:spPr>
-          <a:xfrm>
-            <a:off x="5503530" y="6562504"/>
-            <a:ext cx="1184940" cy="231410"/>
-          </a:xfrm>
-          <a:prstGeom prst="rect">
-            <a:avLst/>
-          </a:prstGeom>
-        </p:spPr>
-        <p:txBody>
-          <a:bodyPr wrap="none">
-            <a:spAutoFit/>
-          </a:bodyPr>
-          <a:lstStyle/>
-          <a:p>
-            <a:pPr algn="ctr"/>
-            <a:r>
-              <a:rPr lang="en-US" sz="1000" dirty="0">
-                <a:solidFill>
-                  <a:schemeClr val="bg1"/>
-                </a:solidFill>
-              </a:rPr>
-              <a:t>Intel Confidential</a:t>
-            </a:r>
-          </a:p>
-        </p:txBody>
-      </p:sp>
-      <p:sp>
-        <p:nvSpPr>
-          <p:cNvPr id="14" name="Rectangle 13">
-            <a:extLst>
-              <a:ext uri="{FF2B5EF4-FFF2-40B4-BE49-F238E27FC236}">
-                <a16:creationId xmlns:a16="http://schemas.microsoft.com/office/drawing/2014/main" id="{2588B335-02FC-4504-AF46-DF56B2EC52E4}"/>
-              </a:ext>
-            </a:extLst>
-          </p:cNvPr>
-          <p:cNvSpPr/>
-          <p:nvPr userDrawn="1"/>
-        </p:nvSpPr>
-        <p:spPr>
-          <a:xfrm>
-            <a:off x="483010" y="6562504"/>
-            <a:ext cx="1766830" cy="231410"/>
-          </a:xfrm>
-          <a:prstGeom prst="rect">
-            <a:avLst/>
-          </a:prstGeom>
-        </p:spPr>
-        <p:txBody>
-          <a:bodyPr wrap="none">
-            <a:spAutoFit/>
-          </a:bodyPr>
-          <a:lstStyle/>
-          <a:p>
-            <a:pPr algn="l"/>
-            <a:r>
-              <a:rPr lang="en-US" sz="1000" dirty="0">
-                <a:solidFill>
-                  <a:schemeClr val="bg1"/>
-                </a:solidFill>
-              </a:rPr>
-              <a:t>Department or Event Name</a:t>
-            </a:r>
-          </a:p>
-        </p:txBody>
-      </p:sp>
-      <p:sp>
-        <p:nvSpPr>
           <p:cNvPr id="16" name="Title Text">
             <a:extLst>
               <a:ext uri="{FF2B5EF4-FFF2-40B4-BE49-F238E27FC236}">
@@ -4258,7 +4099,7 @@
           </a:ln>
           <a:extLst>
             <a:ext uri="{C572A759-6A51-4108-AA02-DFA0A04FC94B}">
-              <ma14:wrappingTextBoxFlag xmlns:ma14="http://schemas.microsoft.com/office/mac/drawingml/2011/main" xmlns:a14="http://schemas.microsoft.com/office/drawing/2010/main" xmlns:m="http://schemas.openxmlformats.org/officeDocument/2006/math" xmlns="" val="1"/>
+              <ma14:wrappingTextBoxFlag xmlns="" xmlns:m="http://schemas.openxmlformats.org/officeDocument/2006/math" xmlns:a14="http://schemas.microsoft.com/office/drawing/2010/main" xmlns:ma14="http://schemas.microsoft.com/office/mac/drawingml/2011/main" val="1"/>
             </a:ext>
           </a:extLst>
         </p:spPr>
@@ -4917,7 +4758,7 @@
           </a:ln>
           <a:extLst>
             <a:ext uri="{C572A759-6A51-4108-AA02-DFA0A04FC94B}">
-              <ma14:wrappingTextBoxFlag xmlns:ma14="http://schemas.microsoft.com/office/mac/drawingml/2011/main" xmlns:a14="http://schemas.microsoft.com/office/drawing/2010/main" xmlns:m="http://schemas.openxmlformats.org/officeDocument/2006/math" xmlns="" val="1"/>
+              <ma14:wrappingTextBoxFlag xmlns="" xmlns:m="http://schemas.openxmlformats.org/officeDocument/2006/math" xmlns:a14="http://schemas.microsoft.com/office/drawing/2010/main" xmlns:ma14="http://schemas.microsoft.com/office/mac/drawingml/2011/main" val="1"/>
             </a:ext>
           </a:extLst>
         </p:spPr>
@@ -5621,7 +5462,7 @@
           </a:ln>
           <a:extLst>
             <a:ext uri="{C572A759-6A51-4108-AA02-DFA0A04FC94B}">
-              <ma14:wrappingTextBoxFlag xmlns:ma14="http://schemas.microsoft.com/office/mac/drawingml/2011/main" xmlns:a14="http://schemas.microsoft.com/office/drawing/2010/main" xmlns:m="http://schemas.openxmlformats.org/officeDocument/2006/math" xmlns="" val="1"/>
+              <ma14:wrappingTextBoxFlag xmlns="" xmlns:m="http://schemas.openxmlformats.org/officeDocument/2006/math" xmlns:a14="http://schemas.microsoft.com/office/drawing/2010/main" xmlns:ma14="http://schemas.microsoft.com/office/mac/drawingml/2011/main" val="1"/>
             </a:ext>
           </a:extLst>
         </p:spPr>
@@ -6333,7 +6174,7 @@
           </a:ln>
           <a:extLst>
             <a:ext uri="{C572A759-6A51-4108-AA02-DFA0A04FC94B}">
-              <ma14:wrappingTextBoxFlag xmlns:ma14="http://schemas.microsoft.com/office/mac/drawingml/2011/main" xmlns:a14="http://schemas.microsoft.com/office/drawing/2010/main" xmlns:m="http://schemas.openxmlformats.org/officeDocument/2006/math" xmlns="" val="1"/>
+              <ma14:wrappingTextBoxFlag xmlns="" xmlns:m="http://schemas.openxmlformats.org/officeDocument/2006/math" xmlns:a14="http://schemas.microsoft.com/office/drawing/2010/main" xmlns:ma14="http://schemas.microsoft.com/office/mac/drawingml/2011/main" val="1"/>
             </a:ext>
           </a:extLst>
         </p:spPr>
@@ -7112,7 +6953,7 @@
           </a:ln>
           <a:extLst>
             <a:ext uri="{C572A759-6A51-4108-AA02-DFA0A04FC94B}">
-              <ma14:wrappingTextBoxFlag xmlns:ma14="http://schemas.microsoft.com/office/mac/drawingml/2011/main" xmlns:a14="http://schemas.microsoft.com/office/drawing/2010/main" xmlns:m="http://schemas.openxmlformats.org/officeDocument/2006/math" xmlns="" val="1"/>
+              <ma14:wrappingTextBoxFlag xmlns="" xmlns:m="http://schemas.openxmlformats.org/officeDocument/2006/math" xmlns:a14="http://schemas.microsoft.com/office/drawing/2010/main" xmlns:ma14="http://schemas.microsoft.com/office/mac/drawingml/2011/main" val="1"/>
             </a:ext>
           </a:extLst>
         </p:spPr>
@@ -7359,7 +7200,7 @@
           </a:ln>
           <a:extLst>
             <a:ext uri="{C572A759-6A51-4108-AA02-DFA0A04FC94B}">
-              <ma14:wrappingTextBoxFlag xmlns:ma14="http://schemas.microsoft.com/office/mac/drawingml/2011/main" xmlns:a14="http://schemas.microsoft.com/office/drawing/2010/main" xmlns:m="http://schemas.openxmlformats.org/officeDocument/2006/math" xmlns="" val="1"/>
+              <ma14:wrappingTextBoxFlag xmlns="" xmlns:m="http://schemas.openxmlformats.org/officeDocument/2006/math" xmlns:a14="http://schemas.microsoft.com/office/drawing/2010/main" xmlns:ma14="http://schemas.microsoft.com/office/mac/drawingml/2011/main" val="1"/>
             </a:ext>
           </a:extLst>
         </p:spPr>
@@ -9171,7 +9012,7 @@
           </a:ln>
           <a:extLst>
             <a:ext uri="{C572A759-6A51-4108-AA02-DFA0A04FC94B}">
-              <ma14:wrappingTextBoxFlag xmlns:ma14="http://schemas.microsoft.com/office/mac/drawingml/2011/main" xmlns:a14="http://schemas.microsoft.com/office/drawing/2010/main" xmlns:m="http://schemas.openxmlformats.org/officeDocument/2006/math" xmlns="" val="1"/>
+              <ma14:wrappingTextBoxFlag xmlns="" xmlns:m="http://schemas.openxmlformats.org/officeDocument/2006/math" xmlns:a14="http://schemas.microsoft.com/office/drawing/2010/main" xmlns:ma14="http://schemas.microsoft.com/office/mac/drawingml/2011/main" val="1"/>
             </a:ext>
           </a:extLst>
         </p:spPr>
@@ -9536,7 +9377,7 @@
           </a:ln>
           <a:extLst>
             <a:ext uri="{C572A759-6A51-4108-AA02-DFA0A04FC94B}">
-              <ma14:wrappingTextBoxFlag xmlns:ma14="http://schemas.microsoft.com/office/mac/drawingml/2011/main" xmlns:a14="http://schemas.microsoft.com/office/drawing/2010/main" xmlns:m="http://schemas.openxmlformats.org/officeDocument/2006/math" xmlns="" val="1"/>
+              <ma14:wrappingTextBoxFlag xmlns="" xmlns:m="http://schemas.openxmlformats.org/officeDocument/2006/math" xmlns:a14="http://schemas.microsoft.com/office/drawing/2010/main" xmlns:ma14="http://schemas.microsoft.com/office/mac/drawingml/2011/main" val="1"/>
             </a:ext>
           </a:extLst>
         </p:spPr>
@@ -10224,7 +10065,7 @@
           </a:ln>
           <a:extLst>
             <a:ext uri="{C572A759-6A51-4108-AA02-DFA0A04FC94B}">
-              <ma14:wrappingTextBoxFlag xmlns:ma14="http://schemas.microsoft.com/office/mac/drawingml/2011/main" xmlns:a14="http://schemas.microsoft.com/office/drawing/2010/main" xmlns:m="http://schemas.openxmlformats.org/officeDocument/2006/math" xmlns="" val="1"/>
+              <ma14:wrappingTextBoxFlag xmlns="" xmlns:m="http://schemas.openxmlformats.org/officeDocument/2006/math" xmlns:a14="http://schemas.microsoft.com/office/drawing/2010/main" xmlns:ma14="http://schemas.microsoft.com/office/mac/drawingml/2011/main" val="1"/>
             </a:ext>
           </a:extLst>
         </p:spPr>
@@ -10783,7 +10624,7 @@
           </a:ln>
           <a:extLst>
             <a:ext uri="{C572A759-6A51-4108-AA02-DFA0A04FC94B}">
-              <ma14:wrappingTextBoxFlag xmlns:ma14="http://schemas.microsoft.com/office/mac/drawingml/2011/main" xmlns:a14="http://schemas.microsoft.com/office/drawing/2010/main" xmlns:m="http://schemas.openxmlformats.org/officeDocument/2006/math" xmlns="" val="1"/>
+              <ma14:wrappingTextBoxFlag xmlns="" xmlns:m="http://schemas.openxmlformats.org/officeDocument/2006/math" xmlns:a14="http://schemas.microsoft.com/office/drawing/2010/main" xmlns:ma14="http://schemas.microsoft.com/office/mac/drawingml/2011/main" val="1"/>
             </a:ext>
           </a:extLst>
         </p:spPr>
@@ -11407,7 +11248,7 @@
           </a:ln>
           <a:extLst>
             <a:ext uri="{C572A759-6A51-4108-AA02-DFA0A04FC94B}">
-              <ma14:wrappingTextBoxFlag xmlns:ma14="http://schemas.microsoft.com/office/mac/drawingml/2011/main" xmlns:a14="http://schemas.microsoft.com/office/drawing/2010/main" xmlns:m="http://schemas.openxmlformats.org/officeDocument/2006/math" xmlns="" val="1"/>
+              <ma14:wrappingTextBoxFlag xmlns="" xmlns:m="http://schemas.openxmlformats.org/officeDocument/2006/math" xmlns:a14="http://schemas.microsoft.com/office/drawing/2010/main" xmlns:ma14="http://schemas.microsoft.com/office/mac/drawingml/2011/main" val="1"/>
             </a:ext>
           </a:extLst>
         </p:spPr>
@@ -11869,7 +11710,7 @@
           </a:ln>
           <a:extLst>
             <a:ext uri="{C572A759-6A51-4108-AA02-DFA0A04FC94B}">
-              <ma14:wrappingTextBoxFlag xmlns:ma14="http://schemas.microsoft.com/office/mac/drawingml/2011/main" xmlns:a14="http://schemas.microsoft.com/office/drawing/2010/main" xmlns:m="http://schemas.openxmlformats.org/officeDocument/2006/math" xmlns="" val="1"/>
+              <ma14:wrappingTextBoxFlag xmlns="" xmlns:m="http://schemas.openxmlformats.org/officeDocument/2006/math" xmlns:a14="http://schemas.microsoft.com/office/drawing/2010/main" xmlns:ma14="http://schemas.microsoft.com/office/mac/drawingml/2011/main" val="1"/>
             </a:ext>
           </a:extLst>
         </p:spPr>
@@ -12724,7 +12565,7 @@
           </a:ln>
           <a:extLst>
             <a:ext uri="{C572A759-6A51-4108-AA02-DFA0A04FC94B}">
-              <ma14:wrappingTextBoxFlag xmlns:ma14="http://schemas.microsoft.com/office/mac/drawingml/2011/main" xmlns:a14="http://schemas.microsoft.com/office/drawing/2010/main" xmlns:m="http://schemas.openxmlformats.org/officeDocument/2006/math" xmlns="" val="1"/>
+              <ma14:wrappingTextBoxFlag xmlns="" xmlns:m="http://schemas.openxmlformats.org/officeDocument/2006/math" xmlns:a14="http://schemas.microsoft.com/office/drawing/2010/main" xmlns:ma14="http://schemas.microsoft.com/office/mac/drawingml/2011/main" val="1"/>
             </a:ext>
           </a:extLst>
         </p:spPr>
@@ -14308,7 +14149,7 @@
           </a:ln>
           <a:extLst>
             <a:ext uri="{C572A759-6A51-4108-AA02-DFA0A04FC94B}">
-              <ma14:wrappingTextBoxFlag xmlns:ma14="http://schemas.microsoft.com/office/mac/drawingml/2011/main" xmlns:a14="http://schemas.microsoft.com/office/drawing/2010/main" xmlns:m="http://schemas.openxmlformats.org/officeDocument/2006/math" xmlns="" val="1"/>
+              <ma14:wrappingTextBoxFlag xmlns="" xmlns:m="http://schemas.openxmlformats.org/officeDocument/2006/math" xmlns:a14="http://schemas.microsoft.com/office/drawing/2010/main" xmlns:ma14="http://schemas.microsoft.com/office/mac/drawingml/2011/main" val="1"/>
             </a:ext>
           </a:extLst>
         </p:spPr>
@@ -15909,7 +15750,7 @@
           </a:ln>
           <a:extLst>
             <a:ext uri="{C572A759-6A51-4108-AA02-DFA0A04FC94B}">
-              <ma14:wrappingTextBoxFlag xmlns="" xmlns:m="http://schemas.openxmlformats.org/officeDocument/2006/math" xmlns:a14="http://schemas.microsoft.com/office/drawing/2010/main" xmlns:ma14="http://schemas.microsoft.com/office/mac/drawingml/2011/main" val="1"/>
+              <ma14:wrappingTextBoxFlag xmlns:ma14="http://schemas.microsoft.com/office/mac/drawingml/2011/main" xmlns:a14="http://schemas.microsoft.com/office/drawing/2010/main" xmlns:m="http://schemas.openxmlformats.org/officeDocument/2006/math" xmlns="" val="1"/>
             </a:ext>
           </a:extLst>
         </p:spPr>
@@ -16348,7 +16189,7 @@
           </a:ln>
           <a:extLst>
             <a:ext uri="{C572A759-6A51-4108-AA02-DFA0A04FC94B}">
-              <ma14:wrappingTextBoxFlag xmlns="" xmlns:m="http://schemas.openxmlformats.org/officeDocument/2006/math" xmlns:a14="http://schemas.microsoft.com/office/drawing/2010/main" xmlns:ma14="http://schemas.microsoft.com/office/mac/drawingml/2011/main" val="1"/>
+              <ma14:wrappingTextBoxFlag xmlns:ma14="http://schemas.microsoft.com/office/mac/drawingml/2011/main" xmlns:a14="http://schemas.microsoft.com/office/drawing/2010/main" xmlns:m="http://schemas.openxmlformats.org/officeDocument/2006/math" xmlns="" val="1"/>
             </a:ext>
           </a:extLst>
         </p:spPr>
@@ -16739,7 +16580,7 @@
           </a:ln>
           <a:extLst>
             <a:ext uri="{C572A759-6A51-4108-AA02-DFA0A04FC94B}">
-              <ma14:wrappingTextBoxFlag xmlns:ma14="http://schemas.microsoft.com/office/mac/drawingml/2011/main" xmlns:a14="http://schemas.microsoft.com/office/drawing/2010/main" xmlns:m="http://schemas.openxmlformats.org/officeDocument/2006/math" xmlns="" val="1"/>
+              <ma14:wrappingTextBoxFlag xmlns="" xmlns:m="http://schemas.openxmlformats.org/officeDocument/2006/math" xmlns:a14="http://schemas.microsoft.com/office/drawing/2010/main" xmlns:ma14="http://schemas.microsoft.com/office/mac/drawingml/2011/main" val="1"/>
             </a:ext>
           </a:extLst>
         </p:spPr>
@@ -16835,7 +16676,7 @@
           </a:ln>
           <a:extLst>
             <a:ext uri="{C572A759-6A51-4108-AA02-DFA0A04FC94B}">
-              <ma14:wrappingTextBoxFlag xmlns:ma14="http://schemas.microsoft.com/office/mac/drawingml/2011/main" xmlns:a14="http://schemas.microsoft.com/office/drawing/2010/main" xmlns:m="http://schemas.openxmlformats.org/officeDocument/2006/math" xmlns="" val="1"/>
+              <ma14:wrappingTextBoxFlag xmlns="" xmlns:m="http://schemas.openxmlformats.org/officeDocument/2006/math" xmlns:a14="http://schemas.microsoft.com/office/drawing/2010/main" xmlns:ma14="http://schemas.microsoft.com/office/mac/drawingml/2011/main" val="1"/>
             </a:ext>
           </a:extLst>
         </p:spPr>
@@ -16993,7 +16834,7 @@
           </a:ln>
           <a:extLst>
             <a:ext uri="{C572A759-6A51-4108-AA02-DFA0A04FC94B}">
-              <ma14:wrappingTextBoxFlag xmlns:ma14="http://schemas.microsoft.com/office/mac/drawingml/2011/main" xmlns:a14="http://schemas.microsoft.com/office/drawing/2010/main" xmlns:m="http://schemas.openxmlformats.org/officeDocument/2006/math" xmlns="" val="1"/>
+              <ma14:wrappingTextBoxFlag xmlns="" xmlns:m="http://schemas.openxmlformats.org/officeDocument/2006/math" xmlns:a14="http://schemas.microsoft.com/office/drawing/2010/main" xmlns:ma14="http://schemas.microsoft.com/office/mac/drawingml/2011/main" val="1"/>
             </a:ext>
           </a:extLst>
         </p:spPr>
@@ -17201,7 +17042,7 @@
           </a:ln>
           <a:extLst>
             <a:ext uri="{C572A759-6A51-4108-AA02-DFA0A04FC94B}">
-              <ma14:wrappingTextBoxFlag xmlns:ma14="http://schemas.microsoft.com/office/mac/drawingml/2011/main" xmlns:a14="http://schemas.microsoft.com/office/drawing/2010/main" xmlns:m="http://schemas.openxmlformats.org/officeDocument/2006/math" xmlns="" val="1"/>
+              <ma14:wrappingTextBoxFlag xmlns="" xmlns:m="http://schemas.openxmlformats.org/officeDocument/2006/math" xmlns:a14="http://schemas.microsoft.com/office/drawing/2010/main" xmlns:ma14="http://schemas.microsoft.com/office/mac/drawingml/2011/main" val="1"/>
             </a:ext>
           </a:extLst>
         </p:spPr>
@@ -17471,7 +17312,7 @@
           </a:ln>
           <a:extLst>
             <a:ext uri="{C572A759-6A51-4108-AA02-DFA0A04FC94B}">
-              <ma14:wrappingTextBoxFlag xmlns:ma14="http://schemas.microsoft.com/office/mac/drawingml/2011/main" xmlns:a14="http://schemas.microsoft.com/office/drawing/2010/main" xmlns:m="http://schemas.openxmlformats.org/officeDocument/2006/math" xmlns="" val="1"/>
+              <ma14:wrappingTextBoxFlag xmlns="" xmlns:m="http://schemas.openxmlformats.org/officeDocument/2006/math" xmlns:a14="http://schemas.microsoft.com/office/drawing/2010/main" xmlns:ma14="http://schemas.microsoft.com/office/mac/drawingml/2011/main" val="1"/>
             </a:ext>
           </a:extLst>
         </p:spPr>
@@ -17691,7 +17532,7 @@
           </a:ln>
           <a:extLst>
             <a:ext uri="{C572A759-6A51-4108-AA02-DFA0A04FC94B}">
-              <ma14:wrappingTextBoxFlag xmlns:ma14="http://schemas.microsoft.com/office/mac/drawingml/2011/main" xmlns:a14="http://schemas.microsoft.com/office/drawing/2010/main" xmlns:m="http://schemas.openxmlformats.org/officeDocument/2006/math" xmlns="" val="1"/>
+              <ma14:wrappingTextBoxFlag xmlns="" xmlns:m="http://schemas.openxmlformats.org/officeDocument/2006/math" xmlns:a14="http://schemas.microsoft.com/office/drawing/2010/main" xmlns:ma14="http://schemas.microsoft.com/office/mac/drawingml/2011/main" val="1"/>
             </a:ext>
           </a:extLst>
         </p:spPr>
@@ -17745,7 +17586,7 @@
           </a:ln>
           <a:extLst>
             <a:ext uri="{C572A759-6A51-4108-AA02-DFA0A04FC94B}">
-              <ma14:wrappingTextBoxFlag xmlns:ma14="http://schemas.microsoft.com/office/mac/drawingml/2011/main" xmlns:a14="http://schemas.microsoft.com/office/drawing/2010/main" xmlns:m="http://schemas.openxmlformats.org/officeDocument/2006/math" xmlns="" val="1"/>
+              <ma14:wrappingTextBoxFlag xmlns="" xmlns:m="http://schemas.openxmlformats.org/officeDocument/2006/math" xmlns:a14="http://schemas.microsoft.com/office/drawing/2010/main" xmlns:ma14="http://schemas.microsoft.com/office/mac/drawingml/2011/main" val="1"/>
             </a:ext>
           </a:extLst>
         </p:spPr>
@@ -17813,7 +17654,7 @@
           </a:ln>
           <a:extLst>
             <a:ext uri="{C572A759-6A51-4108-AA02-DFA0A04FC94B}">
-              <ma14:wrappingTextBoxFlag xmlns:ma14="http://schemas.microsoft.com/office/mac/drawingml/2011/main" xmlns:a14="http://schemas.microsoft.com/office/drawing/2010/main" xmlns:m="http://schemas.openxmlformats.org/officeDocument/2006/math" xmlns="" val="1"/>
+              <ma14:wrappingTextBoxFlag xmlns="" xmlns:m="http://schemas.openxmlformats.org/officeDocument/2006/math" xmlns:a14="http://schemas.microsoft.com/office/drawing/2010/main" xmlns:ma14="http://schemas.microsoft.com/office/mac/drawingml/2011/main" val="1"/>
             </a:ext>
           </a:extLst>
         </p:spPr>
@@ -18125,7 +17966,7 @@
           </a:ln>
           <a:extLst>
             <a:ext uri="{C572A759-6A51-4108-AA02-DFA0A04FC94B}">
-              <ma14:wrappingTextBoxFlag xmlns:ma14="http://schemas.microsoft.com/office/mac/drawingml/2011/main" xmlns:a14="http://schemas.microsoft.com/office/drawing/2010/main" xmlns:m="http://schemas.openxmlformats.org/officeDocument/2006/math" xmlns="" val="1"/>
+              <ma14:wrappingTextBoxFlag xmlns="" xmlns:m="http://schemas.openxmlformats.org/officeDocument/2006/math" xmlns:a14="http://schemas.microsoft.com/office/drawing/2010/main" xmlns:ma14="http://schemas.microsoft.com/office/mac/drawingml/2011/main" val="1"/>
             </a:ext>
           </a:extLst>
         </p:spPr>
@@ -18364,7 +18205,7 @@
           </a:ln>
           <a:extLst>
             <a:ext uri="{C572A759-6A51-4108-AA02-DFA0A04FC94B}">
-              <ma14:wrappingTextBoxFlag xmlns:ma14="http://schemas.microsoft.com/office/mac/drawingml/2011/main" xmlns:a14="http://schemas.microsoft.com/office/drawing/2010/main" xmlns:m="http://schemas.openxmlformats.org/officeDocument/2006/math" xmlns="" val="1"/>
+              <ma14:wrappingTextBoxFlag xmlns="" xmlns:m="http://schemas.openxmlformats.org/officeDocument/2006/math" xmlns:a14="http://schemas.microsoft.com/office/drawing/2010/main" xmlns:ma14="http://schemas.microsoft.com/office/mac/drawingml/2011/main" val="1"/>
             </a:ext>
           </a:extLst>
         </p:spPr>
@@ -18460,7 +18301,7 @@
           </a:ln>
           <a:extLst>
             <a:ext uri="{C572A759-6A51-4108-AA02-DFA0A04FC94B}">
-              <ma14:wrappingTextBoxFlag xmlns:ma14="http://schemas.microsoft.com/office/mac/drawingml/2011/main" xmlns:a14="http://schemas.microsoft.com/office/drawing/2010/main" xmlns:m="http://schemas.openxmlformats.org/officeDocument/2006/math" xmlns="" val="1"/>
+              <ma14:wrappingTextBoxFlag xmlns="" xmlns:m="http://schemas.openxmlformats.org/officeDocument/2006/math" xmlns:a14="http://schemas.microsoft.com/office/drawing/2010/main" xmlns:ma14="http://schemas.microsoft.com/office/mac/drawingml/2011/main" val="1"/>
             </a:ext>
           </a:extLst>
         </p:spPr>
@@ -18646,7 +18487,7 @@
           </a:ln>
           <a:extLst>
             <a:ext uri="{C572A759-6A51-4108-AA02-DFA0A04FC94B}">
-              <ma14:wrappingTextBoxFlag xmlns:ma14="http://schemas.microsoft.com/office/mac/drawingml/2011/main" xmlns:a14="http://schemas.microsoft.com/office/drawing/2010/main" xmlns:m="http://schemas.openxmlformats.org/officeDocument/2006/math" xmlns="" val="1"/>
+              <ma14:wrappingTextBoxFlag xmlns="" xmlns:m="http://schemas.openxmlformats.org/officeDocument/2006/math" xmlns:a14="http://schemas.microsoft.com/office/drawing/2010/main" xmlns:ma14="http://schemas.microsoft.com/office/mac/drawingml/2011/main" val="1"/>
             </a:ext>
           </a:extLst>
         </p:spPr>
@@ -18991,7 +18832,7 @@
           </a:ln>
           <a:extLst>
             <a:ext uri="{C572A759-6A51-4108-AA02-DFA0A04FC94B}">
-              <ma14:wrappingTextBoxFlag xmlns:ma14="http://schemas.microsoft.com/office/mac/drawingml/2011/main" xmlns:a14="http://schemas.microsoft.com/office/drawing/2010/main" xmlns:m="http://schemas.openxmlformats.org/officeDocument/2006/math" xmlns="" val="1"/>
+              <ma14:wrappingTextBoxFlag xmlns="" xmlns:m="http://schemas.openxmlformats.org/officeDocument/2006/math" xmlns:a14="http://schemas.microsoft.com/office/drawing/2010/main" xmlns:ma14="http://schemas.microsoft.com/office/mac/drawingml/2011/main" val="1"/>
             </a:ext>
           </a:extLst>
         </p:spPr>
@@ -19369,7 +19210,7 @@
           </a:ln>
           <a:extLst>
             <a:ext uri="{C572A759-6A51-4108-AA02-DFA0A04FC94B}">
-              <ma14:wrappingTextBoxFlag xmlns:ma14="http://schemas.microsoft.com/office/mac/drawingml/2011/main" xmlns:a14="http://schemas.microsoft.com/office/drawing/2010/main" xmlns:m="http://schemas.openxmlformats.org/officeDocument/2006/math" xmlns="" val="1"/>
+              <ma14:wrappingTextBoxFlag xmlns="" xmlns:m="http://schemas.openxmlformats.org/officeDocument/2006/math" xmlns:a14="http://schemas.microsoft.com/office/drawing/2010/main" xmlns:ma14="http://schemas.microsoft.com/office/mac/drawingml/2011/main" val="1"/>
             </a:ext>
           </a:extLst>
         </p:spPr>
@@ -19780,7 +19621,7 @@
           </a:ln>
           <a:extLst>
             <a:ext uri="{C572A759-6A51-4108-AA02-DFA0A04FC94B}">
-              <ma14:wrappingTextBoxFlag xmlns:ma14="http://schemas.microsoft.com/office/mac/drawingml/2011/main" xmlns:a14="http://schemas.microsoft.com/office/drawing/2010/main" xmlns:m="http://schemas.openxmlformats.org/officeDocument/2006/math" xmlns="" val="1"/>
+              <ma14:wrappingTextBoxFlag xmlns="" xmlns:m="http://schemas.openxmlformats.org/officeDocument/2006/math" xmlns:a14="http://schemas.microsoft.com/office/drawing/2010/main" xmlns:ma14="http://schemas.microsoft.com/office/mac/drawingml/2011/main" val="1"/>
             </a:ext>
           </a:extLst>
         </p:spPr>
@@ -20439,7 +20280,7 @@
           </a:ln>
           <a:extLst>
             <a:ext uri="{C572A759-6A51-4108-AA02-DFA0A04FC94B}">
-              <ma14:wrappingTextBoxFlag xmlns:ma14="http://schemas.microsoft.com/office/mac/drawingml/2011/main" xmlns:a14="http://schemas.microsoft.com/office/drawing/2010/main" xmlns:m="http://schemas.openxmlformats.org/officeDocument/2006/math" xmlns="" val="1"/>
+              <ma14:wrappingTextBoxFlag xmlns="" xmlns:m="http://schemas.openxmlformats.org/officeDocument/2006/math" xmlns:a14="http://schemas.microsoft.com/office/drawing/2010/main" xmlns:ma14="http://schemas.microsoft.com/office/mac/drawingml/2011/main" val="1"/>
             </a:ext>
           </a:extLst>
         </p:spPr>
@@ -21142,7 +20983,7 @@
           </a:ln>
           <a:extLst>
             <a:ext uri="{C572A759-6A51-4108-AA02-DFA0A04FC94B}">
-              <ma14:wrappingTextBoxFlag xmlns:ma14="http://schemas.microsoft.com/office/mac/drawingml/2011/main" xmlns:a14="http://schemas.microsoft.com/office/drawing/2010/main" xmlns:m="http://schemas.openxmlformats.org/officeDocument/2006/math" xmlns="" val="1"/>
+              <ma14:wrappingTextBoxFlag xmlns="" xmlns:m="http://schemas.openxmlformats.org/officeDocument/2006/math" xmlns:a14="http://schemas.microsoft.com/office/drawing/2010/main" xmlns:ma14="http://schemas.microsoft.com/office/mac/drawingml/2011/main" val="1"/>
             </a:ext>
           </a:extLst>
         </p:spPr>
@@ -21853,7 +21694,7 @@
           </a:ln>
           <a:extLst>
             <a:ext uri="{C572A759-6A51-4108-AA02-DFA0A04FC94B}">
-              <ma14:wrappingTextBoxFlag xmlns:ma14="http://schemas.microsoft.com/office/mac/drawingml/2011/main" xmlns:a14="http://schemas.microsoft.com/office/drawing/2010/main" xmlns:m="http://schemas.openxmlformats.org/officeDocument/2006/math" xmlns="" val="1"/>
+              <ma14:wrappingTextBoxFlag xmlns="" xmlns:m="http://schemas.openxmlformats.org/officeDocument/2006/math" xmlns:a14="http://schemas.microsoft.com/office/drawing/2010/main" xmlns:ma14="http://schemas.microsoft.com/office/mac/drawingml/2011/main" val="1"/>
             </a:ext>
           </a:extLst>
         </p:spPr>
@@ -22631,7 +22472,7 @@
           </a:ln>
           <a:extLst>
             <a:ext uri="{C572A759-6A51-4108-AA02-DFA0A04FC94B}">
-              <ma14:wrappingTextBoxFlag xmlns:ma14="http://schemas.microsoft.com/office/mac/drawingml/2011/main" xmlns:a14="http://schemas.microsoft.com/office/drawing/2010/main" xmlns:m="http://schemas.openxmlformats.org/officeDocument/2006/math" xmlns="" val="1"/>
+              <ma14:wrappingTextBoxFlag xmlns="" xmlns:m="http://schemas.openxmlformats.org/officeDocument/2006/math" xmlns:a14="http://schemas.microsoft.com/office/drawing/2010/main" xmlns:ma14="http://schemas.microsoft.com/office/mac/drawingml/2011/main" val="1"/>
             </a:ext>
           </a:extLst>
         </p:spPr>
@@ -23035,7 +22876,7 @@
           </a:ln>
           <a:extLst>
             <a:ext uri="{C572A759-6A51-4108-AA02-DFA0A04FC94B}">
-              <ma14:wrappingTextBoxFlag xmlns:ma14="http://schemas.microsoft.com/office/mac/drawingml/2011/main" xmlns:a14="http://schemas.microsoft.com/office/drawing/2010/main" xmlns:m="http://schemas.openxmlformats.org/officeDocument/2006/math" xmlns="" val="1"/>
+              <ma14:wrappingTextBoxFlag xmlns="" xmlns:m="http://schemas.openxmlformats.org/officeDocument/2006/math" xmlns:a14="http://schemas.microsoft.com/office/drawing/2010/main" xmlns:ma14="http://schemas.microsoft.com/office/mac/drawingml/2011/main" val="1"/>
             </a:ext>
           </a:extLst>
         </p:spPr>
@@ -23399,7 +23240,7 @@
           </a:ln>
           <a:extLst>
             <a:ext uri="{C572A759-6A51-4108-AA02-DFA0A04FC94B}">
-              <ma14:wrappingTextBoxFlag xmlns:ma14="http://schemas.microsoft.com/office/mac/drawingml/2011/main" xmlns:a14="http://schemas.microsoft.com/office/drawing/2010/main" xmlns:m="http://schemas.openxmlformats.org/officeDocument/2006/math" xmlns="" val="1"/>
+              <ma14:wrappingTextBoxFlag xmlns="" xmlns:m="http://schemas.openxmlformats.org/officeDocument/2006/math" xmlns:a14="http://schemas.microsoft.com/office/drawing/2010/main" xmlns:ma14="http://schemas.microsoft.com/office/mac/drawingml/2011/main" val="1"/>
             </a:ext>
           </a:extLst>
         </p:spPr>
@@ -24086,7 +23927,7 @@
           </a:ln>
           <a:extLst>
             <a:ext uri="{C572A759-6A51-4108-AA02-DFA0A04FC94B}">
-              <ma14:wrappingTextBoxFlag xmlns:ma14="http://schemas.microsoft.com/office/mac/drawingml/2011/main" xmlns:a14="http://schemas.microsoft.com/office/drawing/2010/main" xmlns:m="http://schemas.openxmlformats.org/officeDocument/2006/math" xmlns="" val="1"/>
+              <ma14:wrappingTextBoxFlag xmlns="" xmlns:m="http://schemas.openxmlformats.org/officeDocument/2006/math" xmlns:a14="http://schemas.microsoft.com/office/drawing/2010/main" xmlns:ma14="http://schemas.microsoft.com/office/mac/drawingml/2011/main" val="1"/>
             </a:ext>
           </a:extLst>
         </p:spPr>
@@ -24617,7 +24458,7 @@
           </a:ln>
           <a:extLst>
             <a:ext uri="{C572A759-6A51-4108-AA02-DFA0A04FC94B}">
-              <ma14:wrappingTextBoxFlag xmlns:ma14="http://schemas.microsoft.com/office/mac/drawingml/2011/main" xmlns:a14="http://schemas.microsoft.com/office/drawing/2010/main" xmlns:m="http://schemas.openxmlformats.org/officeDocument/2006/math" xmlns="" val="1"/>
+              <ma14:wrappingTextBoxFlag xmlns="" xmlns:m="http://schemas.openxmlformats.org/officeDocument/2006/math" xmlns:a14="http://schemas.microsoft.com/office/drawing/2010/main" xmlns:ma14="http://schemas.microsoft.com/office/mac/drawingml/2011/main" val="1"/>
             </a:ext>
           </a:extLst>
         </p:spPr>
@@ -24804,7 +24645,7 @@
           </a:ln>
           <a:extLst>
             <a:ext uri="{C572A759-6A51-4108-AA02-DFA0A04FC94B}">
-              <ma14:wrappingTextBoxFlag xmlns:ma14="http://schemas.microsoft.com/office/mac/drawingml/2011/main" xmlns:a14="http://schemas.microsoft.com/office/drawing/2010/main" xmlns:m="http://schemas.openxmlformats.org/officeDocument/2006/math" xmlns="" val="1"/>
+              <ma14:wrappingTextBoxFlag xmlns="" xmlns:m="http://schemas.openxmlformats.org/officeDocument/2006/math" xmlns:a14="http://schemas.microsoft.com/office/drawing/2010/main" xmlns:ma14="http://schemas.microsoft.com/office/mac/drawingml/2011/main" val="1"/>
             </a:ext>
           </a:extLst>
         </p:spPr>
@@ -25428,7 +25269,7 @@
           </a:ln>
           <a:extLst>
             <a:ext uri="{C572A759-6A51-4108-AA02-DFA0A04FC94B}">
-              <ma14:wrappingTextBoxFlag xmlns:ma14="http://schemas.microsoft.com/office/mac/drawingml/2011/main" xmlns:a14="http://schemas.microsoft.com/office/drawing/2010/main" xmlns:m="http://schemas.openxmlformats.org/officeDocument/2006/math" xmlns="" val="1"/>
+              <ma14:wrappingTextBoxFlag xmlns="" xmlns:m="http://schemas.openxmlformats.org/officeDocument/2006/math" xmlns:a14="http://schemas.microsoft.com/office/drawing/2010/main" xmlns:ma14="http://schemas.microsoft.com/office/mac/drawingml/2011/main" val="1"/>
             </a:ext>
           </a:extLst>
         </p:spPr>
@@ -25890,7 +25731,7 @@
           </a:ln>
           <a:extLst>
             <a:ext uri="{C572A759-6A51-4108-AA02-DFA0A04FC94B}">
-              <ma14:wrappingTextBoxFlag xmlns:ma14="http://schemas.microsoft.com/office/mac/drawingml/2011/main" xmlns:a14="http://schemas.microsoft.com/office/drawing/2010/main" xmlns:m="http://schemas.openxmlformats.org/officeDocument/2006/math" xmlns="" val="1"/>
+              <ma14:wrappingTextBoxFlag xmlns="" xmlns:m="http://schemas.openxmlformats.org/officeDocument/2006/math" xmlns:a14="http://schemas.microsoft.com/office/drawing/2010/main" xmlns:ma14="http://schemas.microsoft.com/office/mac/drawingml/2011/main" val="1"/>
             </a:ext>
           </a:extLst>
         </p:spPr>
@@ -26817,7 +26658,7 @@
           </a:ln>
           <a:extLst>
             <a:ext uri="{C572A759-6A51-4108-AA02-DFA0A04FC94B}">
-              <ma14:wrappingTextBoxFlag xmlns:ma14="http://schemas.microsoft.com/office/mac/drawingml/2011/main" xmlns:a14="http://schemas.microsoft.com/office/drawing/2010/main" xmlns:m="http://schemas.openxmlformats.org/officeDocument/2006/math" xmlns="" val="1"/>
+              <ma14:wrappingTextBoxFlag xmlns="" xmlns:m="http://schemas.openxmlformats.org/officeDocument/2006/math" xmlns:a14="http://schemas.microsoft.com/office/drawing/2010/main" xmlns:ma14="http://schemas.microsoft.com/office/mac/drawingml/2011/main" val="1"/>
             </a:ext>
           </a:extLst>
         </p:spPr>
@@ -27026,7 +26867,7 @@
           </a:ln>
           <a:extLst>
             <a:ext uri="{C572A759-6A51-4108-AA02-DFA0A04FC94B}">
-              <ma14:wrappingTextBoxFlag xmlns:ma14="http://schemas.microsoft.com/office/mac/drawingml/2011/main" xmlns:a14="http://schemas.microsoft.com/office/drawing/2010/main" xmlns:m="http://schemas.openxmlformats.org/officeDocument/2006/math" xmlns="" val="1"/>
+              <ma14:wrappingTextBoxFlag xmlns="" xmlns:m="http://schemas.openxmlformats.org/officeDocument/2006/math" xmlns:a14="http://schemas.microsoft.com/office/drawing/2010/main" xmlns:ma14="http://schemas.microsoft.com/office/mac/drawingml/2011/main" val="1"/>
             </a:ext>
           </a:extLst>
         </p:spPr>
@@ -27298,7 +27139,7 @@
           </a:ln>
           <a:extLst>
             <a:ext uri="{C572A759-6A51-4108-AA02-DFA0A04FC94B}">
-              <ma14:wrappingTextBoxFlag xmlns:ma14="http://schemas.microsoft.com/office/mac/drawingml/2011/main" xmlns:a14="http://schemas.microsoft.com/office/drawing/2010/main" xmlns:m="http://schemas.openxmlformats.org/officeDocument/2006/math" xmlns="" val="1"/>
+              <ma14:wrappingTextBoxFlag xmlns="" xmlns:m="http://schemas.openxmlformats.org/officeDocument/2006/math" xmlns:a14="http://schemas.microsoft.com/office/drawing/2010/main" xmlns:ma14="http://schemas.microsoft.com/office/mac/drawingml/2011/main" val="1"/>
             </a:ext>
           </a:extLst>
         </p:spPr>
@@ -27520,7 +27361,7 @@
           </a:ln>
           <a:extLst>
             <a:ext uri="{C572A759-6A51-4108-AA02-DFA0A04FC94B}">
-              <ma14:wrappingTextBoxFlag xmlns:ma14="http://schemas.microsoft.com/office/mac/drawingml/2011/main" xmlns:a14="http://schemas.microsoft.com/office/drawing/2010/main" xmlns:m="http://schemas.openxmlformats.org/officeDocument/2006/math" xmlns="" val="1"/>
+              <ma14:wrappingTextBoxFlag xmlns="" xmlns:m="http://schemas.openxmlformats.org/officeDocument/2006/math" xmlns:a14="http://schemas.microsoft.com/office/drawing/2010/main" xmlns:ma14="http://schemas.microsoft.com/office/mac/drawingml/2011/main" val="1"/>
             </a:ext>
           </a:extLst>
         </p:spPr>
@@ -27574,7 +27415,7 @@
           </a:ln>
           <a:extLst>
             <a:ext uri="{C572A759-6A51-4108-AA02-DFA0A04FC94B}">
-              <ma14:wrappingTextBoxFlag xmlns:ma14="http://schemas.microsoft.com/office/mac/drawingml/2011/main" xmlns:a14="http://schemas.microsoft.com/office/drawing/2010/main" xmlns:m="http://schemas.openxmlformats.org/officeDocument/2006/math" xmlns="" val="1"/>
+              <ma14:wrappingTextBoxFlag xmlns="" xmlns:m="http://schemas.openxmlformats.org/officeDocument/2006/math" xmlns:a14="http://schemas.microsoft.com/office/drawing/2010/main" xmlns:ma14="http://schemas.microsoft.com/office/mac/drawingml/2011/main" val="1"/>
             </a:ext>
           </a:extLst>
         </p:spPr>
@@ -27642,7 +27483,7 @@
           </a:ln>
           <a:extLst>
             <a:ext uri="{C572A759-6A51-4108-AA02-DFA0A04FC94B}">
-              <ma14:wrappingTextBoxFlag xmlns:ma14="http://schemas.microsoft.com/office/mac/drawingml/2011/main" xmlns:a14="http://schemas.microsoft.com/office/drawing/2010/main" xmlns:m="http://schemas.openxmlformats.org/officeDocument/2006/math" xmlns="" val="1"/>
+              <ma14:wrappingTextBoxFlag xmlns="" xmlns:m="http://schemas.openxmlformats.org/officeDocument/2006/math" xmlns:a14="http://schemas.microsoft.com/office/drawing/2010/main" xmlns:ma14="http://schemas.microsoft.com/office/mac/drawingml/2011/main" val="1"/>
             </a:ext>
           </a:extLst>
         </p:spPr>
@@ -28099,7 +27940,7 @@
           </a:ln>
           <a:extLst>
             <a:ext uri="{C572A759-6A51-4108-AA02-DFA0A04FC94B}">
-              <ma14:wrappingTextBoxFlag xmlns:ma14="http://schemas.microsoft.com/office/mac/drawingml/2011/main" xmlns:a14="http://schemas.microsoft.com/office/drawing/2010/main" xmlns:m="http://schemas.openxmlformats.org/officeDocument/2006/math" xmlns="" val="1"/>
+              <ma14:wrappingTextBoxFlag xmlns="" xmlns:m="http://schemas.openxmlformats.org/officeDocument/2006/math" xmlns:a14="http://schemas.microsoft.com/office/drawing/2010/main" xmlns:ma14="http://schemas.microsoft.com/office/mac/drawingml/2011/main" val="1"/>
             </a:ext>
           </a:extLst>
         </p:spPr>
@@ -28175,7 +28016,7 @@
           </a:ln>
           <a:extLst>
             <a:ext uri="{C572A759-6A51-4108-AA02-DFA0A04FC94B}">
-              <ma14:wrappingTextBoxFlag xmlns:ma14="http://schemas.microsoft.com/office/mac/drawingml/2011/main" xmlns:a14="http://schemas.microsoft.com/office/drawing/2010/main" xmlns:m="http://schemas.openxmlformats.org/officeDocument/2006/math" xmlns="" val="1"/>
+              <ma14:wrappingTextBoxFlag xmlns="" xmlns:m="http://schemas.openxmlformats.org/officeDocument/2006/math" xmlns:a14="http://schemas.microsoft.com/office/drawing/2010/main" xmlns:ma14="http://schemas.microsoft.com/office/mac/drawingml/2011/main" val="1"/>
             </a:ext>
           </a:extLst>
         </p:spPr>
@@ -29442,7 +29283,7 @@
           </a:ln>
           <a:extLst>
             <a:ext uri="{C572A759-6A51-4108-AA02-DFA0A04FC94B}">
-              <ma14:wrappingTextBoxFlag xmlns:ma14="http://schemas.microsoft.com/office/mac/drawingml/2011/main" xmlns:a14="http://schemas.microsoft.com/office/drawing/2010/main" xmlns:m="http://schemas.openxmlformats.org/officeDocument/2006/math" xmlns="" val="1"/>
+              <ma14:wrappingTextBoxFlag xmlns="" xmlns:m="http://schemas.openxmlformats.org/officeDocument/2006/math" xmlns:a14="http://schemas.microsoft.com/office/drawing/2010/main" xmlns:ma14="http://schemas.microsoft.com/office/mac/drawingml/2011/main" val="1"/>
             </a:ext>
           </a:extLst>
         </p:spPr>
@@ -29518,7 +29359,7 @@
           </a:ln>
           <a:extLst>
             <a:ext uri="{C572A759-6A51-4108-AA02-DFA0A04FC94B}">
-              <ma14:wrappingTextBoxFlag xmlns:ma14="http://schemas.microsoft.com/office/mac/drawingml/2011/main" xmlns:a14="http://schemas.microsoft.com/office/drawing/2010/main" xmlns:m="http://schemas.openxmlformats.org/officeDocument/2006/math" xmlns="" val="1"/>
+              <ma14:wrappingTextBoxFlag xmlns="" xmlns:m="http://schemas.openxmlformats.org/officeDocument/2006/math" xmlns:a14="http://schemas.microsoft.com/office/drawing/2010/main" xmlns:ma14="http://schemas.microsoft.com/office/mac/drawingml/2011/main" val="1"/>
             </a:ext>
           </a:extLst>
         </p:spPr>
@@ -30560,15 +30401,7 @@
           <a:p>
             <a:r>
               <a:rPr lang="en-US" dirty="0"/>
-              <a:t>Julie </a:t>
-            </a:r>
-            <a:r>
-              <a:rPr lang="en-US" dirty="0" err="1"/>
-              <a:t>zhang</a:t>
-            </a:r>
-            <a:r>
-              <a:rPr lang="en-US" dirty="0"/>
-              <a:t>        Oct 25th  2021</a:t>
+              <a:t>Oct 25th  2021</a:t>
             </a:r>
           </a:p>
         </p:txBody>
@@ -34740,12 +34573,12 @@
           <a:graphicData uri="http://schemas.openxmlformats.org/presentationml/2006/ole">
             <mc:AlternateContent xmlns:mc="http://schemas.openxmlformats.org/markup-compatibility/2006">
               <mc:Choice xmlns:v="urn:schemas-microsoft-com:vml" Requires="v">
-                <p:oleObj name="Visio" r:id="rId2" imgW="4905343" imgH="6858000" progId="Visio.Drawing.15">
+                <p:oleObj spid="_x0000_s1028" name="Visio" r:id="rId3" imgW="4905343" imgH="6858000" progId="Visio.Drawing.15">
                   <p:embed/>
                 </p:oleObj>
               </mc:Choice>
               <mc:Fallback>
-                <p:oleObj name="Visio" r:id="rId2" imgW="4905343" imgH="6858000" progId="Visio.Drawing.15">
+                <p:oleObj name="Visio" r:id="rId3" imgW="4905343" imgH="6858000" progId="Visio.Drawing.15">
                   <p:embed/>
                   <p:pic>
                     <p:nvPicPr>
@@ -34762,7 +34595,7 @@
                       <p:nvPr/>
                     </p:nvPicPr>
                     <p:blipFill>
-                      <a:blip r:embed="rId3">
+                      <a:blip r:embed="rId4">
                         <a:extLst>
                           <a:ext uri="{28A0092B-C50C-407E-A947-70E740481C1C}">
                             <a14:useLocalDpi xmlns:a14="http://schemas.microsoft.com/office/drawing/2010/main" val="0"/>
@@ -34815,7 +34648,7 @@
           <p:nvPr/>
         </p:nvPicPr>
         <p:blipFill>
-          <a:blip r:embed="rId4"/>
+          <a:blip r:embed="rId5"/>
           <a:stretch>
             <a:fillRect/>
           </a:stretch>
@@ -34845,7 +34678,7 @@
           <p:nvPr/>
         </p:nvPicPr>
         <p:blipFill>
-          <a:blip r:embed="rId5"/>
+          <a:blip r:embed="rId6"/>
           <a:stretch>
             <a:fillRect/>
           </a:stretch>
@@ -35282,12 +35115,12 @@
           <a:graphicData uri="http://schemas.openxmlformats.org/presentationml/2006/ole">
             <mc:AlternateContent xmlns:mc="http://schemas.openxmlformats.org/markup-compatibility/2006">
               <mc:Choice xmlns:v="urn:schemas-microsoft-com:vml" Requires="v">
-                <p:oleObj name="Visio" r:id="rId2" imgW="6141791" imgH="2087675" progId="Visio.Drawing.15">
+                <p:oleObj spid="_x0000_s2052" name="Visio" r:id="rId3" imgW="6141791" imgH="2087675" progId="Visio.Drawing.15">
                   <p:embed/>
                 </p:oleObj>
               </mc:Choice>
               <mc:Fallback>
-                <p:oleObj name="Visio" r:id="rId2" imgW="6141791" imgH="2087675" progId="Visio.Drawing.15">
+                <p:oleObj name="Visio" r:id="rId3" imgW="6141791" imgH="2087675" progId="Visio.Drawing.15">
                   <p:embed/>
                   <p:pic>
                     <p:nvPicPr>
@@ -35304,7 +35137,7 @@
                       <p:nvPr/>
                     </p:nvPicPr>
                     <p:blipFill>
-                      <a:blip r:embed="rId3">
+                      <a:blip r:embed="rId4">
                         <a:extLst>
                           <a:ext uri="{28A0092B-C50C-407E-A947-70E740481C1C}">
                             <a14:useLocalDpi xmlns:a14="http://schemas.microsoft.com/office/drawing/2010/main" val="0"/>
@@ -36324,12 +36157,12 @@
           <a:graphicData uri="http://schemas.openxmlformats.org/presentationml/2006/ole">
             <mc:AlternateContent xmlns:mc="http://schemas.openxmlformats.org/markup-compatibility/2006">
               <mc:Choice xmlns:v="urn:schemas-microsoft-com:vml" Requires="v">
-                <p:oleObj name="Visio" r:id="rId2" imgW="6141791" imgH="2384878" progId="Visio.Drawing.15">
+                <p:oleObj spid="_x0000_s3076" name="Visio" r:id="rId3" imgW="6141791" imgH="2384878" progId="Visio.Drawing.15">
                   <p:embed/>
                 </p:oleObj>
               </mc:Choice>
               <mc:Fallback>
-                <p:oleObj name="Visio" r:id="rId2" imgW="6141791" imgH="2384878" progId="Visio.Drawing.15">
+                <p:oleObj name="Visio" r:id="rId3" imgW="6141791" imgH="2384878" progId="Visio.Drawing.15">
                   <p:embed/>
                   <p:pic>
                     <p:nvPicPr>
@@ -36346,7 +36179,7 @@
                       <p:nvPr/>
                     </p:nvPicPr>
                     <p:blipFill>
-                      <a:blip r:embed="rId3">
+                      <a:blip r:embed="rId4">
                         <a:extLst>
                           <a:ext uri="{28A0092B-C50C-407E-A947-70E740481C1C}">
                             <a14:useLocalDpi xmlns:a14="http://schemas.microsoft.com/office/drawing/2010/main" val="0"/>
@@ -38984,24 +38817,6 @@
 </file>
 
 <file path=customXml/item1.xml><?xml version="1.0" encoding="utf-8"?>
-<p:properties xmlns:p="http://schemas.microsoft.com/office/2006/metadata/properties" xmlns:xsi="http://www.w3.org/2001/XMLSchema-instance" xmlns:pc="http://schemas.microsoft.com/office/infopath/2007/PartnerControls">
-  <documentManagement>
-    <_ip_UnifiedCompliancePolicyUIAction xmlns="http://schemas.microsoft.com/sharepoint/v3" xsi:nil="true"/>
-    <_ip_UnifiedCompliancePolicyProperties xmlns="http://schemas.microsoft.com/sharepoint/v3" xsi:nil="true"/>
-  </documentManagement>
-</p:properties>
-</file>
-
-<file path=customXml/item2.xml><?xml version="1.0" encoding="utf-8"?>
-<?mso-contentType ?>
-<FormTemplates xmlns="http://schemas.microsoft.com/sharepoint/v3/contenttype/forms">
-  <Display>DocumentLibraryForm</Display>
-  <Edit>DocumentLibraryForm</Edit>
-  <New>DocumentLibraryForm</New>
-</FormTemplates>
-</file>
-
-<file path=customXml/item3.xml><?xml version="1.0" encoding="utf-8"?>
 <ct:contentTypeSchema xmlns:ct="http://schemas.microsoft.com/office/2006/metadata/contentType" xmlns:ma="http://schemas.microsoft.com/office/2006/metadata/properties/metaAttributes" ct:_="" ma:_="" ma:contentTypeName="Document" ma:contentTypeID="0x010100D03D0EE2D2295446876114B826DEF78D" ma:contentTypeVersion="15" ma:contentTypeDescription="Create a new document." ma:contentTypeScope="" ma:versionID="dff6746d92cd1cb27242c09b947fd69b">
   <xsd:schema xmlns:xsd="http://www.w3.org/2001/XMLSchema" xmlns:xs="http://www.w3.org/2001/XMLSchema" xmlns:p="http://schemas.microsoft.com/office/2006/metadata/properties" xmlns:ns1="http://schemas.microsoft.com/sharepoint/v3" xmlns:ns3="bbb4e383-f888-41b5-a796-2bb1d9ab62ae" xmlns:ns4="530af12c-1954-46ad-9c94-ddb07003369d" targetNamespace="http://schemas.microsoft.com/office/2006/metadata/properties" ma:root="true" ma:fieldsID="05708c9b62f10479a37610d520e71c6e" ns1:_="" ns3:_="" ns4:_="">
     <xsd:import namespace="http://schemas.microsoft.com/sharepoint/v3"/>
@@ -39241,25 +39056,25 @@
 </ct:contentTypeSchema>
 </file>
 
-<file path=customXml/itemProps1.xml><?xml version="1.0" encoding="utf-8"?>
-<ds:datastoreItem xmlns:ds="http://schemas.openxmlformats.org/officeDocument/2006/customXml" ds:itemID="{724B8A99-8161-4D52-8DFD-478F5C1B3170}">
-  <ds:schemaRefs>
-    <ds:schemaRef ds:uri="http://schemas.microsoft.com/office/2006/metadata/properties"/>
-    <ds:schemaRef ds:uri="http://schemas.microsoft.com/office/infopath/2007/PartnerControls"/>
-    <ds:schemaRef ds:uri="http://schemas.microsoft.com/sharepoint/v3"/>
-  </ds:schemaRefs>
-</ds:datastoreItem>
+<file path=customXml/item2.xml><?xml version="1.0" encoding="utf-8"?>
+<?mso-contentType ?>
+<FormTemplates xmlns="http://schemas.microsoft.com/sharepoint/v3/contenttype/forms">
+  <Display>DocumentLibraryForm</Display>
+  <Edit>DocumentLibraryForm</Edit>
+  <New>DocumentLibraryForm</New>
+</FormTemplates>
 </file>
 
-<file path=customXml/itemProps2.xml><?xml version="1.0" encoding="utf-8"?>
-<ds:datastoreItem xmlns:ds="http://schemas.openxmlformats.org/officeDocument/2006/customXml" ds:itemID="{201C66F3-FBD8-4B0F-98D9-445FE3649D01}">
-  <ds:schemaRefs>
-    <ds:schemaRef ds:uri="http://schemas.microsoft.com/sharepoint/v3/contenttype/forms"/>
-  </ds:schemaRefs>
-</ds:datastoreItem>
+<file path=customXml/item3.xml><?xml version="1.0" encoding="utf-8"?>
+<p:properties xmlns:p="http://schemas.microsoft.com/office/2006/metadata/properties" xmlns:xsi="http://www.w3.org/2001/XMLSchema-instance" xmlns:pc="http://schemas.microsoft.com/office/infopath/2007/PartnerControls">
+  <documentManagement>
+    <_ip_UnifiedCompliancePolicyUIAction xmlns="http://schemas.microsoft.com/sharepoint/v3" xsi:nil="true"/>
+    <_ip_UnifiedCompliancePolicyProperties xmlns="http://schemas.microsoft.com/sharepoint/v3" xsi:nil="true"/>
+  </documentManagement>
+</p:properties>
 </file>
 
-<file path=customXml/itemProps3.xml><?xml version="1.0" encoding="utf-8"?>
+<file path=customXml/itemProps1.xml><?xml version="1.0" encoding="utf-8"?>
 <ds:datastoreItem xmlns:ds="http://schemas.openxmlformats.org/officeDocument/2006/customXml" ds:itemID="{944F81F2-1FFF-46FC-8162-2D79D0CE8941}">
   <ds:schemaRefs>
     <ds:schemaRef ds:uri="http://schemas.microsoft.com/office/2006/metadata/contentType"/>
@@ -39277,4 +39092,22 @@
     <ds:schemaRef ds:uri="http://schemas.microsoft.com/internal/obd"/>
   </ds:schemaRefs>
 </ds:datastoreItem>
+</file>
+
+<file path=customXml/itemProps2.xml><?xml version="1.0" encoding="utf-8"?>
+<ds:datastoreItem xmlns:ds="http://schemas.openxmlformats.org/officeDocument/2006/customXml" ds:itemID="{201C66F3-FBD8-4B0F-98D9-445FE3649D01}">
+  <ds:schemaRefs>
+    <ds:schemaRef ds:uri="http://schemas.microsoft.com/sharepoint/v3/contenttype/forms"/>
+  </ds:schemaRefs>
+</ds:datastoreItem>
+</file>
+
+<file path=customXml/itemProps3.xml><?xml version="1.0" encoding="utf-8"?>
+<ds:datastoreItem xmlns:ds="http://schemas.openxmlformats.org/officeDocument/2006/customXml" ds:itemID="{724B8A99-8161-4D52-8DFD-478F5C1B3170}">
+  <ds:schemaRefs>
+    <ds:schemaRef ds:uri="http://schemas.microsoft.com/office/2006/metadata/properties"/>
+    <ds:schemaRef ds:uri="http://schemas.microsoft.com/office/infopath/2007/PartnerControls"/>
+    <ds:schemaRef ds:uri="http://schemas.microsoft.com/sharepoint/v3"/>
+  </ds:schemaRefs>
+</ds:datastoreItem>
 </file>
</xml_diff>

<commit_message>
Rev 1.1 remove slave miso shared tri state buffer. Replaced with seperated miso pin. See README for detail
Signed-off-by: Julie Zhang <julie.zhang@intel.com>
</commit_message>
<xml_diff>
--- a/spi-aib/doc/SPI_User_guide.pptx
+++ b/spi-aib/doc/SPI_User_guide.pptx
@@ -657,7 +657,7 @@
           <a:p>
             <a:fld id="{E10B726A-C477-6444-83BF-F1538D69AD12}" type="datetimeFigureOut">
               <a:rPr lang="en-US" smtClean="0"/>
-              <a:t>11/8/2021</a:t>
+              <a:t>11/19/2021</a:t>
             </a:fld>
             <a:endParaRPr lang="en-US"/>
           </a:p>
@@ -1173,7 +1173,7 @@
           </a:ln>
           <a:extLst>
             <a:ext uri="{C572A759-6A51-4108-AA02-DFA0A04FC94B}">
-              <ma14:wrappingTextBoxFlag xmlns="" xmlns:m="http://schemas.openxmlformats.org/officeDocument/2006/math" xmlns:a14="http://schemas.microsoft.com/office/drawing/2010/main" xmlns:ma14="http://schemas.microsoft.com/office/mac/drawingml/2011/main" val="1"/>
+              <ma14:wrappingTextBoxFlag xmlns:ma14="http://schemas.microsoft.com/office/mac/drawingml/2011/main" xmlns:a14="http://schemas.microsoft.com/office/drawing/2010/main" xmlns:m="http://schemas.openxmlformats.org/officeDocument/2006/math" xmlns="" val="1"/>
             </a:ext>
           </a:extLst>
         </p:spPr>
@@ -2650,7 +2650,7 @@
           </a:ln>
           <a:extLst>
             <a:ext uri="{C572A759-6A51-4108-AA02-DFA0A04FC94B}">
-              <ma14:wrappingTextBoxFlag xmlns="" xmlns:m="http://schemas.openxmlformats.org/officeDocument/2006/math" xmlns:a14="http://schemas.microsoft.com/office/drawing/2010/main" xmlns:ma14="http://schemas.microsoft.com/office/mac/drawingml/2011/main" val="1"/>
+              <ma14:wrappingTextBoxFlag xmlns:ma14="http://schemas.microsoft.com/office/mac/drawingml/2011/main" xmlns:a14="http://schemas.microsoft.com/office/drawing/2010/main" xmlns:m="http://schemas.openxmlformats.org/officeDocument/2006/math" xmlns="" val="1"/>
             </a:ext>
           </a:extLst>
         </p:spPr>
@@ -2893,7 +2893,7 @@
           </a:ln>
           <a:extLst>
             <a:ext uri="{C572A759-6A51-4108-AA02-DFA0A04FC94B}">
-              <ma14:wrappingTextBoxFlag xmlns="" xmlns:m="http://schemas.openxmlformats.org/officeDocument/2006/math" xmlns:a14="http://schemas.microsoft.com/office/drawing/2010/main" xmlns:ma14="http://schemas.microsoft.com/office/mac/drawingml/2011/main" val="1"/>
+              <ma14:wrappingTextBoxFlag xmlns:ma14="http://schemas.microsoft.com/office/mac/drawingml/2011/main" xmlns:a14="http://schemas.microsoft.com/office/drawing/2010/main" xmlns:m="http://schemas.openxmlformats.org/officeDocument/2006/math" xmlns="" val="1"/>
             </a:ext>
           </a:extLst>
         </p:spPr>
@@ -2989,7 +2989,7 @@
           </a:ln>
           <a:extLst>
             <a:ext uri="{C572A759-6A51-4108-AA02-DFA0A04FC94B}">
-              <ma14:wrappingTextBoxFlag xmlns="" xmlns:m="http://schemas.openxmlformats.org/officeDocument/2006/math" xmlns:a14="http://schemas.microsoft.com/office/drawing/2010/main" xmlns:ma14="http://schemas.microsoft.com/office/mac/drawingml/2011/main" val="1"/>
+              <ma14:wrappingTextBoxFlag xmlns:ma14="http://schemas.microsoft.com/office/mac/drawingml/2011/main" xmlns:a14="http://schemas.microsoft.com/office/drawing/2010/main" xmlns:m="http://schemas.openxmlformats.org/officeDocument/2006/math" xmlns="" val="1"/>
             </a:ext>
           </a:extLst>
         </p:spPr>
@@ -3427,7 +3427,7 @@
           </a:ln>
           <a:extLst>
             <a:ext uri="{C572A759-6A51-4108-AA02-DFA0A04FC94B}">
-              <ma14:wrappingTextBoxFlag xmlns="" xmlns:m="http://schemas.openxmlformats.org/officeDocument/2006/math" xmlns:a14="http://schemas.microsoft.com/office/drawing/2010/main" xmlns:ma14="http://schemas.microsoft.com/office/mac/drawingml/2011/main" val="1"/>
+              <ma14:wrappingTextBoxFlag xmlns:ma14="http://schemas.microsoft.com/office/mac/drawingml/2011/main" xmlns:a14="http://schemas.microsoft.com/office/drawing/2010/main" xmlns:m="http://schemas.openxmlformats.org/officeDocument/2006/math" xmlns="" val="1"/>
             </a:ext>
           </a:extLst>
         </p:spPr>
@@ -3808,7 +3808,7 @@
           </a:ln>
           <a:extLst>
             <a:ext uri="{C572A759-6A51-4108-AA02-DFA0A04FC94B}">
-              <ma14:wrappingTextBoxFlag xmlns="" xmlns:m="http://schemas.openxmlformats.org/officeDocument/2006/math" xmlns:a14="http://schemas.microsoft.com/office/drawing/2010/main" xmlns:ma14="http://schemas.microsoft.com/office/mac/drawingml/2011/main" val="1"/>
+              <ma14:wrappingTextBoxFlag xmlns:ma14="http://schemas.microsoft.com/office/mac/drawingml/2011/main" xmlns:a14="http://schemas.microsoft.com/office/drawing/2010/main" xmlns:m="http://schemas.openxmlformats.org/officeDocument/2006/math" xmlns="" val="1"/>
             </a:ext>
           </a:extLst>
         </p:spPr>
@@ -4099,7 +4099,7 @@
           </a:ln>
           <a:extLst>
             <a:ext uri="{C572A759-6A51-4108-AA02-DFA0A04FC94B}">
-              <ma14:wrappingTextBoxFlag xmlns="" xmlns:m="http://schemas.openxmlformats.org/officeDocument/2006/math" xmlns:a14="http://schemas.microsoft.com/office/drawing/2010/main" xmlns:ma14="http://schemas.microsoft.com/office/mac/drawingml/2011/main" val="1"/>
+              <ma14:wrappingTextBoxFlag xmlns:ma14="http://schemas.microsoft.com/office/mac/drawingml/2011/main" xmlns:a14="http://schemas.microsoft.com/office/drawing/2010/main" xmlns:m="http://schemas.openxmlformats.org/officeDocument/2006/math" xmlns="" val="1"/>
             </a:ext>
           </a:extLst>
         </p:spPr>
@@ -4758,7 +4758,7 @@
           </a:ln>
           <a:extLst>
             <a:ext uri="{C572A759-6A51-4108-AA02-DFA0A04FC94B}">
-              <ma14:wrappingTextBoxFlag xmlns="" xmlns:m="http://schemas.openxmlformats.org/officeDocument/2006/math" xmlns:a14="http://schemas.microsoft.com/office/drawing/2010/main" xmlns:ma14="http://schemas.microsoft.com/office/mac/drawingml/2011/main" val="1"/>
+              <ma14:wrappingTextBoxFlag xmlns:ma14="http://schemas.microsoft.com/office/mac/drawingml/2011/main" xmlns:a14="http://schemas.microsoft.com/office/drawing/2010/main" xmlns:m="http://schemas.openxmlformats.org/officeDocument/2006/math" xmlns="" val="1"/>
             </a:ext>
           </a:extLst>
         </p:spPr>
@@ -5462,7 +5462,7 @@
           </a:ln>
           <a:extLst>
             <a:ext uri="{C572A759-6A51-4108-AA02-DFA0A04FC94B}">
-              <ma14:wrappingTextBoxFlag xmlns="" xmlns:m="http://schemas.openxmlformats.org/officeDocument/2006/math" xmlns:a14="http://schemas.microsoft.com/office/drawing/2010/main" xmlns:ma14="http://schemas.microsoft.com/office/mac/drawingml/2011/main" val="1"/>
+              <ma14:wrappingTextBoxFlag xmlns:ma14="http://schemas.microsoft.com/office/mac/drawingml/2011/main" xmlns:a14="http://schemas.microsoft.com/office/drawing/2010/main" xmlns:m="http://schemas.openxmlformats.org/officeDocument/2006/math" xmlns="" val="1"/>
             </a:ext>
           </a:extLst>
         </p:spPr>
@@ -6174,7 +6174,7 @@
           </a:ln>
           <a:extLst>
             <a:ext uri="{C572A759-6A51-4108-AA02-DFA0A04FC94B}">
-              <ma14:wrappingTextBoxFlag xmlns="" xmlns:m="http://schemas.openxmlformats.org/officeDocument/2006/math" xmlns:a14="http://schemas.microsoft.com/office/drawing/2010/main" xmlns:ma14="http://schemas.microsoft.com/office/mac/drawingml/2011/main" val="1"/>
+              <ma14:wrappingTextBoxFlag xmlns:ma14="http://schemas.microsoft.com/office/mac/drawingml/2011/main" xmlns:a14="http://schemas.microsoft.com/office/drawing/2010/main" xmlns:m="http://schemas.openxmlformats.org/officeDocument/2006/math" xmlns="" val="1"/>
             </a:ext>
           </a:extLst>
         </p:spPr>
@@ -6953,7 +6953,7 @@
           </a:ln>
           <a:extLst>
             <a:ext uri="{C572A759-6A51-4108-AA02-DFA0A04FC94B}">
-              <ma14:wrappingTextBoxFlag xmlns="" xmlns:m="http://schemas.openxmlformats.org/officeDocument/2006/math" xmlns:a14="http://schemas.microsoft.com/office/drawing/2010/main" xmlns:ma14="http://schemas.microsoft.com/office/mac/drawingml/2011/main" val="1"/>
+              <ma14:wrappingTextBoxFlag xmlns:ma14="http://schemas.microsoft.com/office/mac/drawingml/2011/main" xmlns:a14="http://schemas.microsoft.com/office/drawing/2010/main" xmlns:m="http://schemas.openxmlformats.org/officeDocument/2006/math" xmlns="" val="1"/>
             </a:ext>
           </a:extLst>
         </p:spPr>
@@ -7200,7 +7200,7 @@
           </a:ln>
           <a:extLst>
             <a:ext uri="{C572A759-6A51-4108-AA02-DFA0A04FC94B}">
-              <ma14:wrappingTextBoxFlag xmlns="" xmlns:m="http://schemas.openxmlformats.org/officeDocument/2006/math" xmlns:a14="http://schemas.microsoft.com/office/drawing/2010/main" xmlns:ma14="http://schemas.microsoft.com/office/mac/drawingml/2011/main" val="1"/>
+              <ma14:wrappingTextBoxFlag xmlns:ma14="http://schemas.microsoft.com/office/mac/drawingml/2011/main" xmlns:a14="http://schemas.microsoft.com/office/drawing/2010/main" xmlns:m="http://schemas.openxmlformats.org/officeDocument/2006/math" xmlns="" val="1"/>
             </a:ext>
           </a:extLst>
         </p:spPr>
@@ -9012,7 +9012,7 @@
           </a:ln>
           <a:extLst>
             <a:ext uri="{C572A759-6A51-4108-AA02-DFA0A04FC94B}">
-              <ma14:wrappingTextBoxFlag xmlns="" xmlns:m="http://schemas.openxmlformats.org/officeDocument/2006/math" xmlns:a14="http://schemas.microsoft.com/office/drawing/2010/main" xmlns:ma14="http://schemas.microsoft.com/office/mac/drawingml/2011/main" val="1"/>
+              <ma14:wrappingTextBoxFlag xmlns:ma14="http://schemas.microsoft.com/office/mac/drawingml/2011/main" xmlns:a14="http://schemas.microsoft.com/office/drawing/2010/main" xmlns:m="http://schemas.openxmlformats.org/officeDocument/2006/math" xmlns="" val="1"/>
             </a:ext>
           </a:extLst>
         </p:spPr>
@@ -9377,7 +9377,7 @@
           </a:ln>
           <a:extLst>
             <a:ext uri="{C572A759-6A51-4108-AA02-DFA0A04FC94B}">
-              <ma14:wrappingTextBoxFlag xmlns="" xmlns:m="http://schemas.openxmlformats.org/officeDocument/2006/math" xmlns:a14="http://schemas.microsoft.com/office/drawing/2010/main" xmlns:ma14="http://schemas.microsoft.com/office/mac/drawingml/2011/main" val="1"/>
+              <ma14:wrappingTextBoxFlag xmlns:ma14="http://schemas.microsoft.com/office/mac/drawingml/2011/main" xmlns:a14="http://schemas.microsoft.com/office/drawing/2010/main" xmlns:m="http://schemas.openxmlformats.org/officeDocument/2006/math" xmlns="" val="1"/>
             </a:ext>
           </a:extLst>
         </p:spPr>
@@ -10065,7 +10065,7 @@
           </a:ln>
           <a:extLst>
             <a:ext uri="{C572A759-6A51-4108-AA02-DFA0A04FC94B}">
-              <ma14:wrappingTextBoxFlag xmlns="" xmlns:m="http://schemas.openxmlformats.org/officeDocument/2006/math" xmlns:a14="http://schemas.microsoft.com/office/drawing/2010/main" xmlns:ma14="http://schemas.microsoft.com/office/mac/drawingml/2011/main" val="1"/>
+              <ma14:wrappingTextBoxFlag xmlns:ma14="http://schemas.microsoft.com/office/mac/drawingml/2011/main" xmlns:a14="http://schemas.microsoft.com/office/drawing/2010/main" xmlns:m="http://schemas.openxmlformats.org/officeDocument/2006/math" xmlns="" val="1"/>
             </a:ext>
           </a:extLst>
         </p:spPr>
@@ -10624,7 +10624,7 @@
           </a:ln>
           <a:extLst>
             <a:ext uri="{C572A759-6A51-4108-AA02-DFA0A04FC94B}">
-              <ma14:wrappingTextBoxFlag xmlns="" xmlns:m="http://schemas.openxmlformats.org/officeDocument/2006/math" xmlns:a14="http://schemas.microsoft.com/office/drawing/2010/main" xmlns:ma14="http://schemas.microsoft.com/office/mac/drawingml/2011/main" val="1"/>
+              <ma14:wrappingTextBoxFlag xmlns:ma14="http://schemas.microsoft.com/office/mac/drawingml/2011/main" xmlns:a14="http://schemas.microsoft.com/office/drawing/2010/main" xmlns:m="http://schemas.openxmlformats.org/officeDocument/2006/math" xmlns="" val="1"/>
             </a:ext>
           </a:extLst>
         </p:spPr>
@@ -11248,7 +11248,7 @@
           </a:ln>
           <a:extLst>
             <a:ext uri="{C572A759-6A51-4108-AA02-DFA0A04FC94B}">
-              <ma14:wrappingTextBoxFlag xmlns="" xmlns:m="http://schemas.openxmlformats.org/officeDocument/2006/math" xmlns:a14="http://schemas.microsoft.com/office/drawing/2010/main" xmlns:ma14="http://schemas.microsoft.com/office/mac/drawingml/2011/main" val="1"/>
+              <ma14:wrappingTextBoxFlag xmlns:ma14="http://schemas.microsoft.com/office/mac/drawingml/2011/main" xmlns:a14="http://schemas.microsoft.com/office/drawing/2010/main" xmlns:m="http://schemas.openxmlformats.org/officeDocument/2006/math" xmlns="" val="1"/>
             </a:ext>
           </a:extLst>
         </p:spPr>
@@ -11710,7 +11710,7 @@
           </a:ln>
           <a:extLst>
             <a:ext uri="{C572A759-6A51-4108-AA02-DFA0A04FC94B}">
-              <ma14:wrappingTextBoxFlag xmlns="" xmlns:m="http://schemas.openxmlformats.org/officeDocument/2006/math" xmlns:a14="http://schemas.microsoft.com/office/drawing/2010/main" xmlns:ma14="http://schemas.microsoft.com/office/mac/drawingml/2011/main" val="1"/>
+              <ma14:wrappingTextBoxFlag xmlns:ma14="http://schemas.microsoft.com/office/mac/drawingml/2011/main" xmlns:a14="http://schemas.microsoft.com/office/drawing/2010/main" xmlns:m="http://schemas.openxmlformats.org/officeDocument/2006/math" xmlns="" val="1"/>
             </a:ext>
           </a:extLst>
         </p:spPr>
@@ -12565,7 +12565,7 @@
           </a:ln>
           <a:extLst>
             <a:ext uri="{C572A759-6A51-4108-AA02-DFA0A04FC94B}">
-              <ma14:wrappingTextBoxFlag xmlns="" xmlns:m="http://schemas.openxmlformats.org/officeDocument/2006/math" xmlns:a14="http://schemas.microsoft.com/office/drawing/2010/main" xmlns:ma14="http://schemas.microsoft.com/office/mac/drawingml/2011/main" val="1"/>
+              <ma14:wrappingTextBoxFlag xmlns:ma14="http://schemas.microsoft.com/office/mac/drawingml/2011/main" xmlns:a14="http://schemas.microsoft.com/office/drawing/2010/main" xmlns:m="http://schemas.openxmlformats.org/officeDocument/2006/math" xmlns="" val="1"/>
             </a:ext>
           </a:extLst>
         </p:spPr>
@@ -14149,7 +14149,7 @@
           </a:ln>
           <a:extLst>
             <a:ext uri="{C572A759-6A51-4108-AA02-DFA0A04FC94B}">
-              <ma14:wrappingTextBoxFlag xmlns="" xmlns:m="http://schemas.openxmlformats.org/officeDocument/2006/math" xmlns:a14="http://schemas.microsoft.com/office/drawing/2010/main" xmlns:ma14="http://schemas.microsoft.com/office/mac/drawingml/2011/main" val="1"/>
+              <ma14:wrappingTextBoxFlag xmlns:ma14="http://schemas.microsoft.com/office/mac/drawingml/2011/main" xmlns:a14="http://schemas.microsoft.com/office/drawing/2010/main" xmlns:m="http://schemas.openxmlformats.org/officeDocument/2006/math" xmlns="" val="1"/>
             </a:ext>
           </a:extLst>
         </p:spPr>
@@ -15750,7 +15750,7 @@
           </a:ln>
           <a:extLst>
             <a:ext uri="{C572A759-6A51-4108-AA02-DFA0A04FC94B}">
-              <ma14:wrappingTextBoxFlag xmlns:ma14="http://schemas.microsoft.com/office/mac/drawingml/2011/main" xmlns:a14="http://schemas.microsoft.com/office/drawing/2010/main" xmlns:m="http://schemas.openxmlformats.org/officeDocument/2006/math" xmlns="" val="1"/>
+              <ma14:wrappingTextBoxFlag xmlns="" xmlns:m="http://schemas.openxmlformats.org/officeDocument/2006/math" xmlns:a14="http://schemas.microsoft.com/office/drawing/2010/main" xmlns:ma14="http://schemas.microsoft.com/office/mac/drawingml/2011/main" val="1"/>
             </a:ext>
           </a:extLst>
         </p:spPr>
@@ -16189,7 +16189,7 @@
           </a:ln>
           <a:extLst>
             <a:ext uri="{C572A759-6A51-4108-AA02-DFA0A04FC94B}">
-              <ma14:wrappingTextBoxFlag xmlns:ma14="http://schemas.microsoft.com/office/mac/drawingml/2011/main" xmlns:a14="http://schemas.microsoft.com/office/drawing/2010/main" xmlns:m="http://schemas.openxmlformats.org/officeDocument/2006/math" xmlns="" val="1"/>
+              <ma14:wrappingTextBoxFlag xmlns="" xmlns:m="http://schemas.openxmlformats.org/officeDocument/2006/math" xmlns:a14="http://schemas.microsoft.com/office/drawing/2010/main" xmlns:ma14="http://schemas.microsoft.com/office/mac/drawingml/2011/main" val="1"/>
             </a:ext>
           </a:extLst>
         </p:spPr>
@@ -16580,7 +16580,7 @@
           </a:ln>
           <a:extLst>
             <a:ext uri="{C572A759-6A51-4108-AA02-DFA0A04FC94B}">
-              <ma14:wrappingTextBoxFlag xmlns="" xmlns:m="http://schemas.openxmlformats.org/officeDocument/2006/math" xmlns:a14="http://schemas.microsoft.com/office/drawing/2010/main" xmlns:ma14="http://schemas.microsoft.com/office/mac/drawingml/2011/main" val="1"/>
+              <ma14:wrappingTextBoxFlag xmlns:ma14="http://schemas.microsoft.com/office/mac/drawingml/2011/main" xmlns:a14="http://schemas.microsoft.com/office/drawing/2010/main" xmlns:m="http://schemas.openxmlformats.org/officeDocument/2006/math" xmlns="" val="1"/>
             </a:ext>
           </a:extLst>
         </p:spPr>
@@ -16676,7 +16676,7 @@
           </a:ln>
           <a:extLst>
             <a:ext uri="{C572A759-6A51-4108-AA02-DFA0A04FC94B}">
-              <ma14:wrappingTextBoxFlag xmlns="" xmlns:m="http://schemas.openxmlformats.org/officeDocument/2006/math" xmlns:a14="http://schemas.microsoft.com/office/drawing/2010/main" xmlns:ma14="http://schemas.microsoft.com/office/mac/drawingml/2011/main" val="1"/>
+              <ma14:wrappingTextBoxFlag xmlns:ma14="http://schemas.microsoft.com/office/mac/drawingml/2011/main" xmlns:a14="http://schemas.microsoft.com/office/drawing/2010/main" xmlns:m="http://schemas.openxmlformats.org/officeDocument/2006/math" xmlns="" val="1"/>
             </a:ext>
           </a:extLst>
         </p:spPr>
@@ -16834,7 +16834,7 @@
           </a:ln>
           <a:extLst>
             <a:ext uri="{C572A759-6A51-4108-AA02-DFA0A04FC94B}">
-              <ma14:wrappingTextBoxFlag xmlns="" xmlns:m="http://schemas.openxmlformats.org/officeDocument/2006/math" xmlns:a14="http://schemas.microsoft.com/office/drawing/2010/main" xmlns:ma14="http://schemas.microsoft.com/office/mac/drawingml/2011/main" val="1"/>
+              <ma14:wrappingTextBoxFlag xmlns:ma14="http://schemas.microsoft.com/office/mac/drawingml/2011/main" xmlns:a14="http://schemas.microsoft.com/office/drawing/2010/main" xmlns:m="http://schemas.openxmlformats.org/officeDocument/2006/math" xmlns="" val="1"/>
             </a:ext>
           </a:extLst>
         </p:spPr>
@@ -17042,7 +17042,7 @@
           </a:ln>
           <a:extLst>
             <a:ext uri="{C572A759-6A51-4108-AA02-DFA0A04FC94B}">
-              <ma14:wrappingTextBoxFlag xmlns="" xmlns:m="http://schemas.openxmlformats.org/officeDocument/2006/math" xmlns:a14="http://schemas.microsoft.com/office/drawing/2010/main" xmlns:ma14="http://schemas.microsoft.com/office/mac/drawingml/2011/main" val="1"/>
+              <ma14:wrappingTextBoxFlag xmlns:ma14="http://schemas.microsoft.com/office/mac/drawingml/2011/main" xmlns:a14="http://schemas.microsoft.com/office/drawing/2010/main" xmlns:m="http://schemas.openxmlformats.org/officeDocument/2006/math" xmlns="" val="1"/>
             </a:ext>
           </a:extLst>
         </p:spPr>
@@ -17312,7 +17312,7 @@
           </a:ln>
           <a:extLst>
             <a:ext uri="{C572A759-6A51-4108-AA02-DFA0A04FC94B}">
-              <ma14:wrappingTextBoxFlag xmlns="" xmlns:m="http://schemas.openxmlformats.org/officeDocument/2006/math" xmlns:a14="http://schemas.microsoft.com/office/drawing/2010/main" xmlns:ma14="http://schemas.microsoft.com/office/mac/drawingml/2011/main" val="1"/>
+              <ma14:wrappingTextBoxFlag xmlns:ma14="http://schemas.microsoft.com/office/mac/drawingml/2011/main" xmlns:a14="http://schemas.microsoft.com/office/drawing/2010/main" xmlns:m="http://schemas.openxmlformats.org/officeDocument/2006/math" xmlns="" val="1"/>
             </a:ext>
           </a:extLst>
         </p:spPr>
@@ -17532,7 +17532,7 @@
           </a:ln>
           <a:extLst>
             <a:ext uri="{C572A759-6A51-4108-AA02-DFA0A04FC94B}">
-              <ma14:wrappingTextBoxFlag xmlns="" xmlns:m="http://schemas.openxmlformats.org/officeDocument/2006/math" xmlns:a14="http://schemas.microsoft.com/office/drawing/2010/main" xmlns:ma14="http://schemas.microsoft.com/office/mac/drawingml/2011/main" val="1"/>
+              <ma14:wrappingTextBoxFlag xmlns:ma14="http://schemas.microsoft.com/office/mac/drawingml/2011/main" xmlns:a14="http://schemas.microsoft.com/office/drawing/2010/main" xmlns:m="http://schemas.openxmlformats.org/officeDocument/2006/math" xmlns="" val="1"/>
             </a:ext>
           </a:extLst>
         </p:spPr>
@@ -17586,7 +17586,7 @@
           </a:ln>
           <a:extLst>
             <a:ext uri="{C572A759-6A51-4108-AA02-DFA0A04FC94B}">
-              <ma14:wrappingTextBoxFlag xmlns="" xmlns:m="http://schemas.openxmlformats.org/officeDocument/2006/math" xmlns:a14="http://schemas.microsoft.com/office/drawing/2010/main" xmlns:ma14="http://schemas.microsoft.com/office/mac/drawingml/2011/main" val="1"/>
+              <ma14:wrappingTextBoxFlag xmlns:ma14="http://schemas.microsoft.com/office/mac/drawingml/2011/main" xmlns:a14="http://schemas.microsoft.com/office/drawing/2010/main" xmlns:m="http://schemas.openxmlformats.org/officeDocument/2006/math" xmlns="" val="1"/>
             </a:ext>
           </a:extLst>
         </p:spPr>
@@ -17654,7 +17654,7 @@
           </a:ln>
           <a:extLst>
             <a:ext uri="{C572A759-6A51-4108-AA02-DFA0A04FC94B}">
-              <ma14:wrappingTextBoxFlag xmlns="" xmlns:m="http://schemas.openxmlformats.org/officeDocument/2006/math" xmlns:a14="http://schemas.microsoft.com/office/drawing/2010/main" xmlns:ma14="http://schemas.microsoft.com/office/mac/drawingml/2011/main" val="1"/>
+              <ma14:wrappingTextBoxFlag xmlns:ma14="http://schemas.microsoft.com/office/mac/drawingml/2011/main" xmlns:a14="http://schemas.microsoft.com/office/drawing/2010/main" xmlns:m="http://schemas.openxmlformats.org/officeDocument/2006/math" xmlns="" val="1"/>
             </a:ext>
           </a:extLst>
         </p:spPr>
@@ -17966,7 +17966,7 @@
           </a:ln>
           <a:extLst>
             <a:ext uri="{C572A759-6A51-4108-AA02-DFA0A04FC94B}">
-              <ma14:wrappingTextBoxFlag xmlns="" xmlns:m="http://schemas.openxmlformats.org/officeDocument/2006/math" xmlns:a14="http://schemas.microsoft.com/office/drawing/2010/main" xmlns:ma14="http://schemas.microsoft.com/office/mac/drawingml/2011/main" val="1"/>
+              <ma14:wrappingTextBoxFlag xmlns:ma14="http://schemas.microsoft.com/office/mac/drawingml/2011/main" xmlns:a14="http://schemas.microsoft.com/office/drawing/2010/main" xmlns:m="http://schemas.openxmlformats.org/officeDocument/2006/math" xmlns="" val="1"/>
             </a:ext>
           </a:extLst>
         </p:spPr>
@@ -18205,7 +18205,7 @@
           </a:ln>
           <a:extLst>
             <a:ext uri="{C572A759-6A51-4108-AA02-DFA0A04FC94B}">
-              <ma14:wrappingTextBoxFlag xmlns="" xmlns:m="http://schemas.openxmlformats.org/officeDocument/2006/math" xmlns:a14="http://schemas.microsoft.com/office/drawing/2010/main" xmlns:ma14="http://schemas.microsoft.com/office/mac/drawingml/2011/main" val="1"/>
+              <ma14:wrappingTextBoxFlag xmlns:ma14="http://schemas.microsoft.com/office/mac/drawingml/2011/main" xmlns:a14="http://schemas.microsoft.com/office/drawing/2010/main" xmlns:m="http://schemas.openxmlformats.org/officeDocument/2006/math" xmlns="" val="1"/>
             </a:ext>
           </a:extLst>
         </p:spPr>
@@ -18301,7 +18301,7 @@
           </a:ln>
           <a:extLst>
             <a:ext uri="{C572A759-6A51-4108-AA02-DFA0A04FC94B}">
-              <ma14:wrappingTextBoxFlag xmlns="" xmlns:m="http://schemas.openxmlformats.org/officeDocument/2006/math" xmlns:a14="http://schemas.microsoft.com/office/drawing/2010/main" xmlns:ma14="http://schemas.microsoft.com/office/mac/drawingml/2011/main" val="1"/>
+              <ma14:wrappingTextBoxFlag xmlns:ma14="http://schemas.microsoft.com/office/mac/drawingml/2011/main" xmlns:a14="http://schemas.microsoft.com/office/drawing/2010/main" xmlns:m="http://schemas.openxmlformats.org/officeDocument/2006/math" xmlns="" val="1"/>
             </a:ext>
           </a:extLst>
         </p:spPr>
@@ -18487,7 +18487,7 @@
           </a:ln>
           <a:extLst>
             <a:ext uri="{C572A759-6A51-4108-AA02-DFA0A04FC94B}">
-              <ma14:wrappingTextBoxFlag xmlns="" xmlns:m="http://schemas.openxmlformats.org/officeDocument/2006/math" xmlns:a14="http://schemas.microsoft.com/office/drawing/2010/main" xmlns:ma14="http://schemas.microsoft.com/office/mac/drawingml/2011/main" val="1"/>
+              <ma14:wrappingTextBoxFlag xmlns:ma14="http://schemas.microsoft.com/office/mac/drawingml/2011/main" xmlns:a14="http://schemas.microsoft.com/office/drawing/2010/main" xmlns:m="http://schemas.openxmlformats.org/officeDocument/2006/math" xmlns="" val="1"/>
             </a:ext>
           </a:extLst>
         </p:spPr>
@@ -18832,7 +18832,7 @@
           </a:ln>
           <a:extLst>
             <a:ext uri="{C572A759-6A51-4108-AA02-DFA0A04FC94B}">
-              <ma14:wrappingTextBoxFlag xmlns="" xmlns:m="http://schemas.openxmlformats.org/officeDocument/2006/math" xmlns:a14="http://schemas.microsoft.com/office/drawing/2010/main" xmlns:ma14="http://schemas.microsoft.com/office/mac/drawingml/2011/main" val="1"/>
+              <ma14:wrappingTextBoxFlag xmlns:ma14="http://schemas.microsoft.com/office/mac/drawingml/2011/main" xmlns:a14="http://schemas.microsoft.com/office/drawing/2010/main" xmlns:m="http://schemas.openxmlformats.org/officeDocument/2006/math" xmlns="" val="1"/>
             </a:ext>
           </a:extLst>
         </p:spPr>
@@ -19210,7 +19210,7 @@
           </a:ln>
           <a:extLst>
             <a:ext uri="{C572A759-6A51-4108-AA02-DFA0A04FC94B}">
-              <ma14:wrappingTextBoxFlag xmlns="" xmlns:m="http://schemas.openxmlformats.org/officeDocument/2006/math" xmlns:a14="http://schemas.microsoft.com/office/drawing/2010/main" xmlns:ma14="http://schemas.microsoft.com/office/mac/drawingml/2011/main" val="1"/>
+              <ma14:wrappingTextBoxFlag xmlns:ma14="http://schemas.microsoft.com/office/mac/drawingml/2011/main" xmlns:a14="http://schemas.microsoft.com/office/drawing/2010/main" xmlns:m="http://schemas.openxmlformats.org/officeDocument/2006/math" xmlns="" val="1"/>
             </a:ext>
           </a:extLst>
         </p:spPr>
@@ -19621,7 +19621,7 @@
           </a:ln>
           <a:extLst>
             <a:ext uri="{C572A759-6A51-4108-AA02-DFA0A04FC94B}">
-              <ma14:wrappingTextBoxFlag xmlns="" xmlns:m="http://schemas.openxmlformats.org/officeDocument/2006/math" xmlns:a14="http://schemas.microsoft.com/office/drawing/2010/main" xmlns:ma14="http://schemas.microsoft.com/office/mac/drawingml/2011/main" val="1"/>
+              <ma14:wrappingTextBoxFlag xmlns:ma14="http://schemas.microsoft.com/office/mac/drawingml/2011/main" xmlns:a14="http://schemas.microsoft.com/office/drawing/2010/main" xmlns:m="http://schemas.openxmlformats.org/officeDocument/2006/math" xmlns="" val="1"/>
             </a:ext>
           </a:extLst>
         </p:spPr>
@@ -20280,7 +20280,7 @@
           </a:ln>
           <a:extLst>
             <a:ext uri="{C572A759-6A51-4108-AA02-DFA0A04FC94B}">
-              <ma14:wrappingTextBoxFlag xmlns="" xmlns:m="http://schemas.openxmlformats.org/officeDocument/2006/math" xmlns:a14="http://schemas.microsoft.com/office/drawing/2010/main" xmlns:ma14="http://schemas.microsoft.com/office/mac/drawingml/2011/main" val="1"/>
+              <ma14:wrappingTextBoxFlag xmlns:ma14="http://schemas.microsoft.com/office/mac/drawingml/2011/main" xmlns:a14="http://schemas.microsoft.com/office/drawing/2010/main" xmlns:m="http://schemas.openxmlformats.org/officeDocument/2006/math" xmlns="" val="1"/>
             </a:ext>
           </a:extLst>
         </p:spPr>
@@ -20983,7 +20983,7 @@
           </a:ln>
           <a:extLst>
             <a:ext uri="{C572A759-6A51-4108-AA02-DFA0A04FC94B}">
-              <ma14:wrappingTextBoxFlag xmlns="" xmlns:m="http://schemas.openxmlformats.org/officeDocument/2006/math" xmlns:a14="http://schemas.microsoft.com/office/drawing/2010/main" xmlns:ma14="http://schemas.microsoft.com/office/mac/drawingml/2011/main" val="1"/>
+              <ma14:wrappingTextBoxFlag xmlns:ma14="http://schemas.microsoft.com/office/mac/drawingml/2011/main" xmlns:a14="http://schemas.microsoft.com/office/drawing/2010/main" xmlns:m="http://schemas.openxmlformats.org/officeDocument/2006/math" xmlns="" val="1"/>
             </a:ext>
           </a:extLst>
         </p:spPr>
@@ -21694,7 +21694,7 @@
           </a:ln>
           <a:extLst>
             <a:ext uri="{C572A759-6A51-4108-AA02-DFA0A04FC94B}">
-              <ma14:wrappingTextBoxFlag xmlns="" xmlns:m="http://schemas.openxmlformats.org/officeDocument/2006/math" xmlns:a14="http://schemas.microsoft.com/office/drawing/2010/main" xmlns:ma14="http://schemas.microsoft.com/office/mac/drawingml/2011/main" val="1"/>
+              <ma14:wrappingTextBoxFlag xmlns:ma14="http://schemas.microsoft.com/office/mac/drawingml/2011/main" xmlns:a14="http://schemas.microsoft.com/office/drawing/2010/main" xmlns:m="http://schemas.openxmlformats.org/officeDocument/2006/math" xmlns="" val="1"/>
             </a:ext>
           </a:extLst>
         </p:spPr>
@@ -22472,7 +22472,7 @@
           </a:ln>
           <a:extLst>
             <a:ext uri="{C572A759-6A51-4108-AA02-DFA0A04FC94B}">
-              <ma14:wrappingTextBoxFlag xmlns="" xmlns:m="http://schemas.openxmlformats.org/officeDocument/2006/math" xmlns:a14="http://schemas.microsoft.com/office/drawing/2010/main" xmlns:ma14="http://schemas.microsoft.com/office/mac/drawingml/2011/main" val="1"/>
+              <ma14:wrappingTextBoxFlag xmlns:ma14="http://schemas.microsoft.com/office/mac/drawingml/2011/main" xmlns:a14="http://schemas.microsoft.com/office/drawing/2010/main" xmlns:m="http://schemas.openxmlformats.org/officeDocument/2006/math" xmlns="" val="1"/>
             </a:ext>
           </a:extLst>
         </p:spPr>
@@ -22876,7 +22876,7 @@
           </a:ln>
           <a:extLst>
             <a:ext uri="{C572A759-6A51-4108-AA02-DFA0A04FC94B}">
-              <ma14:wrappingTextBoxFlag xmlns="" xmlns:m="http://schemas.openxmlformats.org/officeDocument/2006/math" xmlns:a14="http://schemas.microsoft.com/office/drawing/2010/main" xmlns:ma14="http://schemas.microsoft.com/office/mac/drawingml/2011/main" val="1"/>
+              <ma14:wrappingTextBoxFlag xmlns:ma14="http://schemas.microsoft.com/office/mac/drawingml/2011/main" xmlns:a14="http://schemas.microsoft.com/office/drawing/2010/main" xmlns:m="http://schemas.openxmlformats.org/officeDocument/2006/math" xmlns="" val="1"/>
             </a:ext>
           </a:extLst>
         </p:spPr>
@@ -23240,7 +23240,7 @@
           </a:ln>
           <a:extLst>
             <a:ext uri="{C572A759-6A51-4108-AA02-DFA0A04FC94B}">
-              <ma14:wrappingTextBoxFlag xmlns="" xmlns:m="http://schemas.openxmlformats.org/officeDocument/2006/math" xmlns:a14="http://schemas.microsoft.com/office/drawing/2010/main" xmlns:ma14="http://schemas.microsoft.com/office/mac/drawingml/2011/main" val="1"/>
+              <ma14:wrappingTextBoxFlag xmlns:ma14="http://schemas.microsoft.com/office/mac/drawingml/2011/main" xmlns:a14="http://schemas.microsoft.com/office/drawing/2010/main" xmlns:m="http://schemas.openxmlformats.org/officeDocument/2006/math" xmlns="" val="1"/>
             </a:ext>
           </a:extLst>
         </p:spPr>
@@ -23927,7 +23927,7 @@
           </a:ln>
           <a:extLst>
             <a:ext uri="{C572A759-6A51-4108-AA02-DFA0A04FC94B}">
-              <ma14:wrappingTextBoxFlag xmlns="" xmlns:m="http://schemas.openxmlformats.org/officeDocument/2006/math" xmlns:a14="http://schemas.microsoft.com/office/drawing/2010/main" xmlns:ma14="http://schemas.microsoft.com/office/mac/drawingml/2011/main" val="1"/>
+              <ma14:wrappingTextBoxFlag xmlns:ma14="http://schemas.microsoft.com/office/mac/drawingml/2011/main" xmlns:a14="http://schemas.microsoft.com/office/drawing/2010/main" xmlns:m="http://schemas.openxmlformats.org/officeDocument/2006/math" xmlns="" val="1"/>
             </a:ext>
           </a:extLst>
         </p:spPr>
@@ -24458,7 +24458,7 @@
           </a:ln>
           <a:extLst>
             <a:ext uri="{C572A759-6A51-4108-AA02-DFA0A04FC94B}">
-              <ma14:wrappingTextBoxFlag xmlns="" xmlns:m="http://schemas.openxmlformats.org/officeDocument/2006/math" xmlns:a14="http://schemas.microsoft.com/office/drawing/2010/main" xmlns:ma14="http://schemas.microsoft.com/office/mac/drawingml/2011/main" val="1"/>
+              <ma14:wrappingTextBoxFlag xmlns:ma14="http://schemas.microsoft.com/office/mac/drawingml/2011/main" xmlns:a14="http://schemas.microsoft.com/office/drawing/2010/main" xmlns:m="http://schemas.openxmlformats.org/officeDocument/2006/math" xmlns="" val="1"/>
             </a:ext>
           </a:extLst>
         </p:spPr>
@@ -24645,7 +24645,7 @@
           </a:ln>
           <a:extLst>
             <a:ext uri="{C572A759-6A51-4108-AA02-DFA0A04FC94B}">
-              <ma14:wrappingTextBoxFlag xmlns="" xmlns:m="http://schemas.openxmlformats.org/officeDocument/2006/math" xmlns:a14="http://schemas.microsoft.com/office/drawing/2010/main" xmlns:ma14="http://schemas.microsoft.com/office/mac/drawingml/2011/main" val="1"/>
+              <ma14:wrappingTextBoxFlag xmlns:ma14="http://schemas.microsoft.com/office/mac/drawingml/2011/main" xmlns:a14="http://schemas.microsoft.com/office/drawing/2010/main" xmlns:m="http://schemas.openxmlformats.org/officeDocument/2006/math" xmlns="" val="1"/>
             </a:ext>
           </a:extLst>
         </p:spPr>
@@ -25269,7 +25269,7 @@
           </a:ln>
           <a:extLst>
             <a:ext uri="{C572A759-6A51-4108-AA02-DFA0A04FC94B}">
-              <ma14:wrappingTextBoxFlag xmlns="" xmlns:m="http://schemas.openxmlformats.org/officeDocument/2006/math" xmlns:a14="http://schemas.microsoft.com/office/drawing/2010/main" xmlns:ma14="http://schemas.microsoft.com/office/mac/drawingml/2011/main" val="1"/>
+              <ma14:wrappingTextBoxFlag xmlns:ma14="http://schemas.microsoft.com/office/mac/drawingml/2011/main" xmlns:a14="http://schemas.microsoft.com/office/drawing/2010/main" xmlns:m="http://schemas.openxmlformats.org/officeDocument/2006/math" xmlns="" val="1"/>
             </a:ext>
           </a:extLst>
         </p:spPr>
@@ -25731,7 +25731,7 @@
           </a:ln>
           <a:extLst>
             <a:ext uri="{C572A759-6A51-4108-AA02-DFA0A04FC94B}">
-              <ma14:wrappingTextBoxFlag xmlns="" xmlns:m="http://schemas.openxmlformats.org/officeDocument/2006/math" xmlns:a14="http://schemas.microsoft.com/office/drawing/2010/main" xmlns:ma14="http://schemas.microsoft.com/office/mac/drawingml/2011/main" val="1"/>
+              <ma14:wrappingTextBoxFlag xmlns:ma14="http://schemas.microsoft.com/office/mac/drawingml/2011/main" xmlns:a14="http://schemas.microsoft.com/office/drawing/2010/main" xmlns:m="http://schemas.openxmlformats.org/officeDocument/2006/math" xmlns="" val="1"/>
             </a:ext>
           </a:extLst>
         </p:spPr>
@@ -26658,7 +26658,7 @@
           </a:ln>
           <a:extLst>
             <a:ext uri="{C572A759-6A51-4108-AA02-DFA0A04FC94B}">
-              <ma14:wrappingTextBoxFlag xmlns="" xmlns:m="http://schemas.openxmlformats.org/officeDocument/2006/math" xmlns:a14="http://schemas.microsoft.com/office/drawing/2010/main" xmlns:ma14="http://schemas.microsoft.com/office/mac/drawingml/2011/main" val="1"/>
+              <ma14:wrappingTextBoxFlag xmlns:ma14="http://schemas.microsoft.com/office/mac/drawingml/2011/main" xmlns:a14="http://schemas.microsoft.com/office/drawing/2010/main" xmlns:m="http://schemas.openxmlformats.org/officeDocument/2006/math" xmlns="" val="1"/>
             </a:ext>
           </a:extLst>
         </p:spPr>
@@ -26867,7 +26867,7 @@
           </a:ln>
           <a:extLst>
             <a:ext uri="{C572A759-6A51-4108-AA02-DFA0A04FC94B}">
-              <ma14:wrappingTextBoxFlag xmlns="" xmlns:m="http://schemas.openxmlformats.org/officeDocument/2006/math" xmlns:a14="http://schemas.microsoft.com/office/drawing/2010/main" xmlns:ma14="http://schemas.microsoft.com/office/mac/drawingml/2011/main" val="1"/>
+              <ma14:wrappingTextBoxFlag xmlns:ma14="http://schemas.microsoft.com/office/mac/drawingml/2011/main" xmlns:a14="http://schemas.microsoft.com/office/drawing/2010/main" xmlns:m="http://schemas.openxmlformats.org/officeDocument/2006/math" xmlns="" val="1"/>
             </a:ext>
           </a:extLst>
         </p:spPr>
@@ -27139,7 +27139,7 @@
           </a:ln>
           <a:extLst>
             <a:ext uri="{C572A759-6A51-4108-AA02-DFA0A04FC94B}">
-              <ma14:wrappingTextBoxFlag xmlns="" xmlns:m="http://schemas.openxmlformats.org/officeDocument/2006/math" xmlns:a14="http://schemas.microsoft.com/office/drawing/2010/main" xmlns:ma14="http://schemas.microsoft.com/office/mac/drawingml/2011/main" val="1"/>
+              <ma14:wrappingTextBoxFlag xmlns:ma14="http://schemas.microsoft.com/office/mac/drawingml/2011/main" xmlns:a14="http://schemas.microsoft.com/office/drawing/2010/main" xmlns:m="http://schemas.openxmlformats.org/officeDocument/2006/math" xmlns="" val="1"/>
             </a:ext>
           </a:extLst>
         </p:spPr>
@@ -27361,7 +27361,7 @@
           </a:ln>
           <a:extLst>
             <a:ext uri="{C572A759-6A51-4108-AA02-DFA0A04FC94B}">
-              <ma14:wrappingTextBoxFlag xmlns="" xmlns:m="http://schemas.openxmlformats.org/officeDocument/2006/math" xmlns:a14="http://schemas.microsoft.com/office/drawing/2010/main" xmlns:ma14="http://schemas.microsoft.com/office/mac/drawingml/2011/main" val="1"/>
+              <ma14:wrappingTextBoxFlag xmlns:ma14="http://schemas.microsoft.com/office/mac/drawingml/2011/main" xmlns:a14="http://schemas.microsoft.com/office/drawing/2010/main" xmlns:m="http://schemas.openxmlformats.org/officeDocument/2006/math" xmlns="" val="1"/>
             </a:ext>
           </a:extLst>
         </p:spPr>
@@ -27415,7 +27415,7 @@
           </a:ln>
           <a:extLst>
             <a:ext uri="{C572A759-6A51-4108-AA02-DFA0A04FC94B}">
-              <ma14:wrappingTextBoxFlag xmlns="" xmlns:m="http://schemas.openxmlformats.org/officeDocument/2006/math" xmlns:a14="http://schemas.microsoft.com/office/drawing/2010/main" xmlns:ma14="http://schemas.microsoft.com/office/mac/drawingml/2011/main" val="1"/>
+              <ma14:wrappingTextBoxFlag xmlns:ma14="http://schemas.microsoft.com/office/mac/drawingml/2011/main" xmlns:a14="http://schemas.microsoft.com/office/drawing/2010/main" xmlns:m="http://schemas.openxmlformats.org/officeDocument/2006/math" xmlns="" val="1"/>
             </a:ext>
           </a:extLst>
         </p:spPr>
@@ -27483,7 +27483,7 @@
           </a:ln>
           <a:extLst>
             <a:ext uri="{C572A759-6A51-4108-AA02-DFA0A04FC94B}">
-              <ma14:wrappingTextBoxFlag xmlns="" xmlns:m="http://schemas.openxmlformats.org/officeDocument/2006/math" xmlns:a14="http://schemas.microsoft.com/office/drawing/2010/main" xmlns:ma14="http://schemas.microsoft.com/office/mac/drawingml/2011/main" val="1"/>
+              <ma14:wrappingTextBoxFlag xmlns:ma14="http://schemas.microsoft.com/office/mac/drawingml/2011/main" xmlns:a14="http://schemas.microsoft.com/office/drawing/2010/main" xmlns:m="http://schemas.openxmlformats.org/officeDocument/2006/math" xmlns="" val="1"/>
             </a:ext>
           </a:extLst>
         </p:spPr>
@@ -27940,7 +27940,7 @@
           </a:ln>
           <a:extLst>
             <a:ext uri="{C572A759-6A51-4108-AA02-DFA0A04FC94B}">
-              <ma14:wrappingTextBoxFlag xmlns="" xmlns:m="http://schemas.openxmlformats.org/officeDocument/2006/math" xmlns:a14="http://schemas.microsoft.com/office/drawing/2010/main" xmlns:ma14="http://schemas.microsoft.com/office/mac/drawingml/2011/main" val="1"/>
+              <ma14:wrappingTextBoxFlag xmlns:ma14="http://schemas.microsoft.com/office/mac/drawingml/2011/main" xmlns:a14="http://schemas.microsoft.com/office/drawing/2010/main" xmlns:m="http://schemas.openxmlformats.org/officeDocument/2006/math" xmlns="" val="1"/>
             </a:ext>
           </a:extLst>
         </p:spPr>
@@ -28016,7 +28016,7 @@
           </a:ln>
           <a:extLst>
             <a:ext uri="{C572A759-6A51-4108-AA02-DFA0A04FC94B}">
-              <ma14:wrappingTextBoxFlag xmlns="" xmlns:m="http://schemas.openxmlformats.org/officeDocument/2006/math" xmlns:a14="http://schemas.microsoft.com/office/drawing/2010/main" xmlns:ma14="http://schemas.microsoft.com/office/mac/drawingml/2011/main" val="1"/>
+              <ma14:wrappingTextBoxFlag xmlns:ma14="http://schemas.microsoft.com/office/mac/drawingml/2011/main" xmlns:a14="http://schemas.microsoft.com/office/drawing/2010/main" xmlns:m="http://schemas.openxmlformats.org/officeDocument/2006/math" xmlns="" val="1"/>
             </a:ext>
           </a:extLst>
         </p:spPr>
@@ -29283,7 +29283,7 @@
           </a:ln>
           <a:extLst>
             <a:ext uri="{C572A759-6A51-4108-AA02-DFA0A04FC94B}">
-              <ma14:wrappingTextBoxFlag xmlns="" xmlns:m="http://schemas.openxmlformats.org/officeDocument/2006/math" xmlns:a14="http://schemas.microsoft.com/office/drawing/2010/main" xmlns:ma14="http://schemas.microsoft.com/office/mac/drawingml/2011/main" val="1"/>
+              <ma14:wrappingTextBoxFlag xmlns:ma14="http://schemas.microsoft.com/office/mac/drawingml/2011/main" xmlns:a14="http://schemas.microsoft.com/office/drawing/2010/main" xmlns:m="http://schemas.openxmlformats.org/officeDocument/2006/math" xmlns="" val="1"/>
             </a:ext>
           </a:extLst>
         </p:spPr>
@@ -29359,7 +29359,7 @@
           </a:ln>
           <a:extLst>
             <a:ext uri="{C572A759-6A51-4108-AA02-DFA0A04FC94B}">
-              <ma14:wrappingTextBoxFlag xmlns="" xmlns:m="http://schemas.openxmlformats.org/officeDocument/2006/math" xmlns:a14="http://schemas.microsoft.com/office/drawing/2010/main" xmlns:ma14="http://schemas.microsoft.com/office/mac/drawingml/2011/main" val="1"/>
+              <ma14:wrappingTextBoxFlag xmlns:ma14="http://schemas.microsoft.com/office/mac/drawingml/2011/main" xmlns:a14="http://schemas.microsoft.com/office/drawing/2010/main" xmlns:m="http://schemas.openxmlformats.org/officeDocument/2006/math" xmlns="" val="1"/>
             </a:ext>
           </a:extLst>
         </p:spPr>
@@ -30401,7 +30401,7 @@
           <a:p>
             <a:r>
               <a:rPr lang="en-US" dirty="0"/>
-              <a:t>Oct 25th  2021</a:t>
+              <a:t>Nov 19th  2021</a:t>
             </a:r>
           </a:p>
         </p:txBody>
@@ -34012,10 +34012,10 @@
       </p:pic>
       <p:pic>
         <p:nvPicPr>
-          <p:cNvPr id="8" name="Picture 7">
+          <p:cNvPr id="10" name="Picture 9">
             <a:extLst>
               <a:ext uri="{FF2B5EF4-FFF2-40B4-BE49-F238E27FC236}">
-                <a16:creationId xmlns:a16="http://schemas.microsoft.com/office/drawing/2014/main" id="{5E119A92-F42B-449B-8CA8-B3779721AC92}"/>
+                <a16:creationId xmlns:a16="http://schemas.microsoft.com/office/drawing/2014/main" id="{40AEDC4A-45D5-4D91-B48D-21A432D0C034}"/>
               </a:ext>
             </a:extLst>
           </p:cNvPr>
@@ -34032,8 +34032,8 @@
         </p:blipFill>
         <p:spPr>
           <a:xfrm>
-            <a:off x="0" y="5464887"/>
-            <a:ext cx="6443831" cy="1129552"/>
+            <a:off x="6443831" y="1010062"/>
+            <a:ext cx="5748169" cy="2260263"/>
           </a:xfrm>
           <a:prstGeom prst="rect">
             <a:avLst/>
@@ -34042,10 +34042,10 @@
       </p:pic>
       <p:pic>
         <p:nvPicPr>
-          <p:cNvPr id="10" name="Picture 9">
+          <p:cNvPr id="4" name="Picture 3">
             <a:extLst>
               <a:ext uri="{FF2B5EF4-FFF2-40B4-BE49-F238E27FC236}">
-                <a16:creationId xmlns:a16="http://schemas.microsoft.com/office/drawing/2014/main" id="{40AEDC4A-45D5-4D91-B48D-21A432D0C034}"/>
+                <a16:creationId xmlns:a16="http://schemas.microsoft.com/office/drawing/2014/main" id="{1CC4ECC0-C90C-4ED6-A90E-6F953ACC02EC}"/>
               </a:ext>
             </a:extLst>
           </p:cNvPr>
@@ -34062,8 +34062,8 @@
         </p:blipFill>
         <p:spPr>
           <a:xfrm>
-            <a:off x="6443831" y="1010062"/>
-            <a:ext cx="5748169" cy="2260263"/>
+            <a:off x="0" y="5464886"/>
+            <a:ext cx="6443830" cy="975445"/>
           </a:xfrm>
           <a:prstGeom prst="rect">
             <a:avLst/>
@@ -34157,36 +34157,6 @@
       </p:sp>
       <p:pic>
         <p:nvPicPr>
-          <p:cNvPr id="4" name="Picture 3">
-            <a:extLst>
-              <a:ext uri="{FF2B5EF4-FFF2-40B4-BE49-F238E27FC236}">
-                <a16:creationId xmlns:a16="http://schemas.microsoft.com/office/drawing/2014/main" id="{B27A90DC-B382-4052-9D31-343CA2AE7DEF}"/>
-              </a:ext>
-            </a:extLst>
-          </p:cNvPr>
-          <p:cNvPicPr>
-            <a:picLocks noChangeAspect="1"/>
-          </p:cNvPicPr>
-          <p:nvPr/>
-        </p:nvPicPr>
-        <p:blipFill>
-          <a:blip r:embed="rId2"/>
-          <a:stretch>
-            <a:fillRect/>
-          </a:stretch>
-        </p:blipFill>
-        <p:spPr>
-          <a:xfrm>
-            <a:off x="0" y="1008349"/>
-            <a:ext cx="6149687" cy="4695825"/>
-          </a:xfrm>
-          <a:prstGeom prst="rect">
-            <a:avLst/>
-          </a:prstGeom>
-        </p:spPr>
-      </p:pic>
-      <p:pic>
-        <p:nvPicPr>
           <p:cNvPr id="7" name="Picture 6">
             <a:extLst>
               <a:ext uri="{FF2B5EF4-FFF2-40B4-BE49-F238E27FC236}">
@@ -34200,7 +34170,7 @@
           <p:nvPr/>
         </p:nvPicPr>
         <p:blipFill>
-          <a:blip r:embed="rId3"/>
+          <a:blip r:embed="rId2"/>
           <a:stretch>
             <a:fillRect/>
           </a:stretch>
@@ -34230,6 +34200,36 @@
           <p:nvPr/>
         </p:nvPicPr>
         <p:blipFill>
+          <a:blip r:embed="rId3"/>
+          <a:stretch>
+            <a:fillRect/>
+          </a:stretch>
+        </p:blipFill>
+        <p:spPr>
+          <a:xfrm>
+            <a:off x="6093884" y="1690830"/>
+            <a:ext cx="6149687" cy="4038600"/>
+          </a:xfrm>
+          <a:prstGeom prst="rect">
+            <a:avLst/>
+          </a:prstGeom>
+        </p:spPr>
+      </p:pic>
+      <p:pic>
+        <p:nvPicPr>
+          <p:cNvPr id="5" name="Picture 4">
+            <a:extLst>
+              <a:ext uri="{FF2B5EF4-FFF2-40B4-BE49-F238E27FC236}">
+                <a16:creationId xmlns:a16="http://schemas.microsoft.com/office/drawing/2014/main" id="{9EC6042C-DF5E-41E0-AAEF-A66D69D5D3E9}"/>
+              </a:ext>
+            </a:extLst>
+          </p:cNvPr>
+          <p:cNvPicPr>
+            <a:picLocks noChangeAspect="1"/>
+          </p:cNvPicPr>
+          <p:nvPr/>
+        </p:nvPicPr>
+        <p:blipFill>
           <a:blip r:embed="rId4"/>
           <a:stretch>
             <a:fillRect/>
@@ -34237,8 +34237,8 @@
         </p:blipFill>
         <p:spPr>
           <a:xfrm>
-            <a:off x="6093884" y="1690830"/>
-            <a:ext cx="6149687" cy="4038600"/>
+            <a:off x="174746" y="1033604"/>
+            <a:ext cx="5921253" cy="4628642"/>
           </a:xfrm>
           <a:prstGeom prst="rect">
             <a:avLst/>
@@ -34573,7 +34573,7 @@
           <a:graphicData uri="http://schemas.openxmlformats.org/presentationml/2006/ole">
             <mc:AlternateContent xmlns:mc="http://schemas.openxmlformats.org/markup-compatibility/2006">
               <mc:Choice xmlns:v="urn:schemas-microsoft-com:vml" Requires="v">
-                <p:oleObj spid="_x0000_s1028" name="Visio" r:id="rId3" imgW="4905343" imgH="6858000" progId="Visio.Drawing.15">
+                <p:oleObj spid="_x0000_s1031" name="Visio" r:id="rId3" imgW="4905343" imgH="6858000" progId="Visio.Drawing.15">
                   <p:embed/>
                 </p:oleObj>
               </mc:Choice>
@@ -35115,7 +35115,7 @@
           <a:graphicData uri="http://schemas.openxmlformats.org/presentationml/2006/ole">
             <mc:AlternateContent xmlns:mc="http://schemas.openxmlformats.org/markup-compatibility/2006">
               <mc:Choice xmlns:v="urn:schemas-microsoft-com:vml" Requires="v">
-                <p:oleObj spid="_x0000_s2052" name="Visio" r:id="rId3" imgW="6141791" imgH="2087675" progId="Visio.Drawing.15">
+                <p:oleObj spid="_x0000_s2055" name="Visio" r:id="rId3" imgW="6141791" imgH="2087675" progId="Visio.Drawing.15">
                   <p:embed/>
                 </p:oleObj>
               </mc:Choice>
@@ -36157,7 +36157,7 @@
           <a:graphicData uri="http://schemas.openxmlformats.org/presentationml/2006/ole">
             <mc:AlternateContent xmlns:mc="http://schemas.openxmlformats.org/markup-compatibility/2006">
               <mc:Choice xmlns:v="urn:schemas-microsoft-com:vml" Requires="v">
-                <p:oleObj spid="_x0000_s3076" name="Visio" r:id="rId3" imgW="6141791" imgH="2384878" progId="Visio.Drawing.15">
+                <p:oleObj spid="_x0000_s3079" name="Visio" r:id="rId3" imgW="6141791" imgH="2384878" progId="Visio.Drawing.15">
                   <p:embed/>
                 </p:oleObj>
               </mc:Choice>
@@ -39057,21 +39057,21 @@
 </file>
 
 <file path=customXml/item2.xml><?xml version="1.0" encoding="utf-8"?>
+<p:properties xmlns:p="http://schemas.microsoft.com/office/2006/metadata/properties" xmlns:xsi="http://www.w3.org/2001/XMLSchema-instance" xmlns:pc="http://schemas.microsoft.com/office/infopath/2007/PartnerControls">
+  <documentManagement>
+    <_ip_UnifiedCompliancePolicyUIAction xmlns="http://schemas.microsoft.com/sharepoint/v3" xsi:nil="true"/>
+    <_ip_UnifiedCompliancePolicyProperties xmlns="http://schemas.microsoft.com/sharepoint/v3" xsi:nil="true"/>
+  </documentManagement>
+</p:properties>
+</file>
+
+<file path=customXml/item3.xml><?xml version="1.0" encoding="utf-8"?>
 <?mso-contentType ?>
 <FormTemplates xmlns="http://schemas.microsoft.com/sharepoint/v3/contenttype/forms">
   <Display>DocumentLibraryForm</Display>
   <Edit>DocumentLibraryForm</Edit>
   <New>DocumentLibraryForm</New>
 </FormTemplates>
-</file>
-
-<file path=customXml/item3.xml><?xml version="1.0" encoding="utf-8"?>
-<p:properties xmlns:p="http://schemas.microsoft.com/office/2006/metadata/properties" xmlns:xsi="http://www.w3.org/2001/XMLSchema-instance" xmlns:pc="http://schemas.microsoft.com/office/infopath/2007/PartnerControls">
-  <documentManagement>
-    <_ip_UnifiedCompliancePolicyUIAction xmlns="http://schemas.microsoft.com/sharepoint/v3" xsi:nil="true"/>
-    <_ip_UnifiedCompliancePolicyProperties xmlns="http://schemas.microsoft.com/sharepoint/v3" xsi:nil="true"/>
-  </documentManagement>
-</p:properties>
 </file>
 
 <file path=customXml/itemProps1.xml><?xml version="1.0" encoding="utf-8"?>
@@ -39095,14 +39095,6 @@
 </file>
 
 <file path=customXml/itemProps2.xml><?xml version="1.0" encoding="utf-8"?>
-<ds:datastoreItem xmlns:ds="http://schemas.openxmlformats.org/officeDocument/2006/customXml" ds:itemID="{201C66F3-FBD8-4B0F-98D9-445FE3649D01}">
-  <ds:schemaRefs>
-    <ds:schemaRef ds:uri="http://schemas.microsoft.com/sharepoint/v3/contenttype/forms"/>
-  </ds:schemaRefs>
-</ds:datastoreItem>
-</file>
-
-<file path=customXml/itemProps3.xml><?xml version="1.0" encoding="utf-8"?>
 <ds:datastoreItem xmlns:ds="http://schemas.openxmlformats.org/officeDocument/2006/customXml" ds:itemID="{724B8A99-8161-4D52-8DFD-478F5C1B3170}">
   <ds:schemaRefs>
     <ds:schemaRef ds:uri="http://schemas.microsoft.com/office/2006/metadata/properties"/>
@@ -39110,4 +39102,12 @@
     <ds:schemaRef ds:uri="http://schemas.microsoft.com/sharepoint/v3"/>
   </ds:schemaRefs>
 </ds:datastoreItem>
+</file>
+
+<file path=customXml/itemProps3.xml><?xml version="1.0" encoding="utf-8"?>
+<ds:datastoreItem xmlns:ds="http://schemas.openxmlformats.org/officeDocument/2006/customXml" ds:itemID="{201C66F3-FBD8-4B0F-98D9-445FE3649D01}">
+  <ds:schemaRefs>
+    <ds:schemaRef ds:uri="http://schemas.microsoft.com/sharepoint/v3/contenttype/forms"/>
+  </ds:schemaRefs>
+</ds:datastoreItem>
 </file>
</xml_diff>